<commit_message>
.final - deadline part 1
</commit_message>
<xml_diff>
--- a/Report/imgs/Presentazione standard1.pptx
+++ b/Report/imgs/Presentazione standard1.pptx
@@ -5,7 +5,7 @@
     <p:sldMasterId id="2147483648" r:id="rId1"/>
   </p:sldMasterIdLst>
   <p:notesMasterIdLst>
-    <p:notesMasterId r:id="rId9"/>
+    <p:notesMasterId r:id="rId18"/>
   </p:notesMasterIdLst>
   <p:sldIdLst>
     <p:sldId id="256" r:id="rId2"/>
@@ -15,6 +15,15 @@
     <p:sldId id="260" r:id="rId6"/>
     <p:sldId id="262" r:id="rId7"/>
     <p:sldId id="261" r:id="rId8"/>
+    <p:sldId id="270" r:id="rId9"/>
+    <p:sldId id="269" r:id="rId10"/>
+    <p:sldId id="268" r:id="rId11"/>
+    <p:sldId id="271" r:id="rId12"/>
+    <p:sldId id="267" r:id="rId13"/>
+    <p:sldId id="266" r:id="rId14"/>
+    <p:sldId id="265" r:id="rId15"/>
+    <p:sldId id="263" r:id="rId16"/>
+    <p:sldId id="264" r:id="rId17"/>
   </p:sldIdLst>
   <p:sldSz cx="12192000" cy="6858000"/>
   <p:notesSz cx="6858000" cy="9144000"/>
@@ -1017,6 +1026,34 @@
 </inkml:ink>
 </file>
 
+<file path=ppt/ink/ink39.xml><?xml version="1.0" encoding="utf-8"?>
+<inkml:ink xmlns:inkml="http://www.w3.org/2003/InkML">
+  <inkml:definitions>
+    <inkml:context xml:id="ctx0">
+      <inkml:inkSource xml:id="inkSrc0">
+        <inkml:traceFormat>
+          <inkml:channel name="X" type="integer" min="-2.14748E9" max="2.14748E9" units="cm"/>
+          <inkml:channel name="Y" type="integer" min="-2.14748E9" max="2.14748E9" units="cm"/>
+          <inkml:channel name="F" type="integer" max="32767" units="dev"/>
+        </inkml:traceFormat>
+        <inkml:channelProperties>
+          <inkml:channelProperty channel="X" name="resolution" value="1000" units="1/cm"/>
+          <inkml:channelProperty channel="Y" name="resolution" value="1000" units="1/cm"/>
+          <inkml:channelProperty channel="F" name="resolution" value="0" units="1/dev"/>
+        </inkml:channelProperties>
+      </inkml:inkSource>
+      <inkml:timestamp xml:id="ts0" timeString="2020-11-19T23:18:49.393"/>
+    </inkml:context>
+    <inkml:brush xml:id="br0">
+      <inkml:brushProperty name="width" value="0.35" units="cm"/>
+      <inkml:brushProperty name="height" value="0.35" units="cm"/>
+      <inkml:brushProperty name="color" value="#FFFFFF"/>
+    </inkml:brush>
+  </inkml:definitions>
+  <inkml:trace contextRef="#ctx0" brushRef="#br0">26 137 24575,'13'32'0,"3"2"0,-7-12 0,5 12 0,4-12 0,1 8 0,2-5 0,-1-6 0,-10-4 0,0-9 0,-8-3 0,7 6 0,15 21 0,9 21 0,13 10 0,-2 0 0,-7-14 0,-12-18 0,-8-12 0,-13-15 0,-23-31 0,2 4 0,-24-34 0,1-6 0,-16-13 0,24 22 0,-1-1 0,0 4 0,1 1 0,6 3 0,2 2 0,-14-24 0,22 41 0,7 16 0,10 15 0,24 27 0,-5-3 0,23 24 0,-13-7 0,4-2 0,-2 5 0,-1-8 0,-6-13 0,-8-7 0,-9-17 0,-21-24 0,2 5 0,-20-26 0,11 13 0,-2 7 0,12 7 0,4 13 0,4 4 0</inkml:trace>
+</inkml:ink>
+</file>
+
 <file path=ppt/ink/ink4.xml><?xml version="1.0" encoding="utf-8"?>
 <inkml:ink xmlns:inkml="http://www.w3.org/2003/InkML">
   <inkml:definitions>
@@ -1042,6 +1079,286 @@
     </inkml:brush>
   </inkml:definitions>
   <inkml:trace contextRef="#ctx0" brushRef="#br0">0 1 24575,'0'0'0</inkml:trace>
+</inkml:ink>
+</file>
+
+<file path=ppt/ink/ink40.xml><?xml version="1.0" encoding="utf-8"?>
+<inkml:ink xmlns:inkml="http://www.w3.org/2003/InkML">
+  <inkml:definitions>
+    <inkml:context xml:id="ctx0">
+      <inkml:inkSource xml:id="inkSrc0">
+        <inkml:traceFormat>
+          <inkml:channel name="X" type="integer" min="-2.14748E9" max="2.14748E9" units="cm"/>
+          <inkml:channel name="Y" type="integer" min="-2.14748E9" max="2.14748E9" units="cm"/>
+          <inkml:channel name="F" type="integer" max="32767" units="dev"/>
+        </inkml:traceFormat>
+        <inkml:channelProperties>
+          <inkml:channelProperty channel="X" name="resolution" value="1000" units="1/cm"/>
+          <inkml:channelProperty channel="Y" name="resolution" value="1000" units="1/cm"/>
+          <inkml:channelProperty channel="F" name="resolution" value="0" units="1/dev"/>
+        </inkml:channelProperties>
+      </inkml:inkSource>
+      <inkml:timestamp xml:id="ts0" timeString="2020-11-19T23:18:57.043"/>
+    </inkml:context>
+    <inkml:brush xml:id="br0">
+      <inkml:brushProperty name="width" value="0.35" units="cm"/>
+      <inkml:brushProperty name="height" value="0.35" units="cm"/>
+      <inkml:brushProperty name="color" value="#FFFFFF"/>
+    </inkml:brush>
+  </inkml:definitions>
+  <inkml:trace contextRef="#ctx0" brushRef="#br0">1 1 24575,'42'0'0,"-7"1"0,-17-1 0,-7 0 0,-4 0 0,8-1 0,-6 1 0,9 0 0,-11 0 0,5 1 0,0 0 0,8 0 0,-1-1 0,1 0 0,-3 0 0,-1 0 0,-2 2 0,-2-2 0,-4 2 0,1-2 0,2 0 0,6 0 0,5 0 0,-1 0 0,1 0 0,-9 0 0,-1 0 0,-5 0 0,1 0 0,2 0 0,-1 0 0,1 0 0,0-2 0,-2 2 0,3-2 0,0 2 0,0 0 0,1 0 0,-4 2 0,2-1 0,1 1 0,6 1 0,-4-2 0,5 1 0,-11-2 0,2 0 0,0 0 0,-3 0 0,9 0 0,-5-2 0,-1 2 0,2-2 0,-4 2 0,3 0 0,2 0 0,-5 0 0,4 0 0,-2-3 0,-2 2 0,-13 19 0,2-8 0,-12 16 0,14-15 0,-1-2 0,2-1 0,-3 1 0,3 0 0,-2 2 0,17-6 0,-9-1 0,12-5 0,-10 0 0,-2 0 0,9 0 0,-6 1 0,3 0 0,-2-2 0,-3 1 0,13-3 0,-12 2 0,6 0 0,-5-4 0,0-1 0</inkml:trace>
+</inkml:ink>
+</file>
+
+<file path=ppt/ink/ink41.xml><?xml version="1.0" encoding="utf-8"?>
+<inkml:ink xmlns:inkml="http://www.w3.org/2003/InkML">
+  <inkml:definitions>
+    <inkml:context xml:id="ctx0">
+      <inkml:inkSource xml:id="inkSrc0">
+        <inkml:traceFormat>
+          <inkml:channel name="X" type="integer" min="-2.14748E9" max="2.14748E9" units="cm"/>
+          <inkml:channel name="Y" type="integer" min="-2.14748E9" max="2.14748E9" units="cm"/>
+          <inkml:channel name="F" type="integer" max="32767" units="dev"/>
+        </inkml:traceFormat>
+        <inkml:channelProperties>
+          <inkml:channelProperty channel="X" name="resolution" value="1000" units="1/cm"/>
+          <inkml:channelProperty channel="Y" name="resolution" value="1000" units="1/cm"/>
+          <inkml:channelProperty channel="F" name="resolution" value="0" units="1/dev"/>
+        </inkml:channelProperties>
+      </inkml:inkSource>
+      <inkml:timestamp xml:id="ts0" timeString="2020-11-19T23:19:01.802"/>
+    </inkml:context>
+    <inkml:brush xml:id="br0">
+      <inkml:brushProperty name="width" value="0.35" units="cm"/>
+      <inkml:brushProperty name="height" value="0.35" units="cm"/>
+      <inkml:brushProperty name="color" value="#FFFFFF"/>
+    </inkml:brush>
+  </inkml:definitions>
+  <inkml:trace contextRef="#ctx0" brushRef="#br0">0 0 24575,'0'0'0</inkml:trace>
+</inkml:ink>
+</file>
+
+<file path=ppt/ink/ink42.xml><?xml version="1.0" encoding="utf-8"?>
+<inkml:ink xmlns:inkml="http://www.w3.org/2003/InkML">
+  <inkml:definitions>
+    <inkml:context xml:id="ctx0">
+      <inkml:inkSource xml:id="inkSrc0">
+        <inkml:traceFormat>
+          <inkml:channel name="X" type="integer" min="-2.14748E9" max="2.14748E9" units="cm"/>
+          <inkml:channel name="Y" type="integer" min="-2.14748E9" max="2.14748E9" units="cm"/>
+          <inkml:channel name="F" type="integer" max="32767" units="dev"/>
+        </inkml:traceFormat>
+        <inkml:channelProperties>
+          <inkml:channelProperty channel="X" name="resolution" value="1000" units="1/cm"/>
+          <inkml:channelProperty channel="Y" name="resolution" value="1000" units="1/cm"/>
+          <inkml:channelProperty channel="F" name="resolution" value="0" units="1/dev"/>
+        </inkml:channelProperties>
+      </inkml:inkSource>
+      <inkml:timestamp xml:id="ts0" timeString="2020-11-19T23:19:05.570"/>
+    </inkml:context>
+    <inkml:brush xml:id="br0">
+      <inkml:brushProperty name="width" value="0.35" units="cm"/>
+      <inkml:brushProperty name="height" value="0.35" units="cm"/>
+      <inkml:brushProperty name="color" value="#FFFFFF"/>
+    </inkml:brush>
+  </inkml:definitions>
+  <inkml:trace contextRef="#ctx0" brushRef="#br0">0 1 24575,'0'0'0</inkml:trace>
+</inkml:ink>
+</file>
+
+<file path=ppt/ink/ink43.xml><?xml version="1.0" encoding="utf-8"?>
+<inkml:ink xmlns:inkml="http://www.w3.org/2003/InkML">
+  <inkml:definitions>
+    <inkml:context xml:id="ctx0">
+      <inkml:inkSource xml:id="inkSrc0">
+        <inkml:traceFormat>
+          <inkml:channel name="X" type="integer" min="-2.14748E9" max="2.14748E9" units="cm"/>
+          <inkml:channel name="Y" type="integer" min="-2.14748E9" max="2.14748E9" units="cm"/>
+          <inkml:channel name="F" type="integer" max="32767" units="dev"/>
+        </inkml:traceFormat>
+        <inkml:channelProperties>
+          <inkml:channelProperty channel="X" name="resolution" value="1000" units="1/cm"/>
+          <inkml:channelProperty channel="Y" name="resolution" value="1000" units="1/cm"/>
+          <inkml:channelProperty channel="F" name="resolution" value="0" units="1/dev"/>
+        </inkml:channelProperties>
+      </inkml:inkSource>
+      <inkml:timestamp xml:id="ts0" timeString="2020-11-19T23:19:06.335"/>
+    </inkml:context>
+    <inkml:brush xml:id="br0">
+      <inkml:brushProperty name="width" value="0.35" units="cm"/>
+      <inkml:brushProperty name="height" value="0.35" units="cm"/>
+      <inkml:brushProperty name="color" value="#FFFFFF"/>
+    </inkml:brush>
+  </inkml:definitions>
+  <inkml:trace contextRef="#ctx0" brushRef="#br0">0 0 24575,'0'0'0</inkml:trace>
+</inkml:ink>
+</file>
+
+<file path=ppt/ink/ink44.xml><?xml version="1.0" encoding="utf-8"?>
+<inkml:ink xmlns:inkml="http://www.w3.org/2003/InkML">
+  <inkml:definitions>
+    <inkml:context xml:id="ctx0">
+      <inkml:inkSource xml:id="inkSrc0">
+        <inkml:traceFormat>
+          <inkml:channel name="X" type="integer" min="-2.14748E9" max="2.14748E9" units="cm"/>
+          <inkml:channel name="Y" type="integer" min="-2.14748E9" max="2.14748E9" units="cm"/>
+          <inkml:channel name="F" type="integer" max="32767" units="dev"/>
+        </inkml:traceFormat>
+        <inkml:channelProperties>
+          <inkml:channelProperty channel="X" name="resolution" value="1000" units="1/cm"/>
+          <inkml:channelProperty channel="Y" name="resolution" value="1000" units="1/cm"/>
+          <inkml:channelProperty channel="F" name="resolution" value="0" units="1/dev"/>
+        </inkml:channelProperties>
+      </inkml:inkSource>
+      <inkml:timestamp xml:id="ts0" timeString="2020-11-19T23:19:08.788"/>
+    </inkml:context>
+    <inkml:brush xml:id="br0">
+      <inkml:brushProperty name="width" value="0.35" units="cm"/>
+      <inkml:brushProperty name="height" value="0.35" units="cm"/>
+      <inkml:brushProperty name="color" value="#FFFFFF"/>
+    </inkml:brush>
+  </inkml:definitions>
+  <inkml:trace contextRef="#ctx0" brushRef="#br0">67 17 24575,'11'33'0,"-3"-9"0,-6-10 0,-1-10 0,9-35 0,-5 18 0,6-23 0,-10 31 0,0-1 0,-3 28 0,1-17 0,-3 21 0,-3-21 0,3 0 0,-11 8 0,5 1 0,-5 1 0,4-1 0,5-7 0,-1-4 0,3 6 0,-2 2 0,2 3 0,0-5 0,2 16 0,-1-1 0,0 26 0,1-12 0,2-9 0,-1-17 0,-1-11 0,-1-1 0</inkml:trace>
+</inkml:ink>
+</file>
+
+<file path=ppt/ink/ink45.xml><?xml version="1.0" encoding="utf-8"?>
+<inkml:ink xmlns:inkml="http://www.w3.org/2003/InkML">
+  <inkml:definitions>
+    <inkml:context xml:id="ctx0">
+      <inkml:inkSource xml:id="inkSrc0">
+        <inkml:traceFormat>
+          <inkml:channel name="X" type="integer" min="-2.14748E9" max="2.14748E9" units="cm"/>
+          <inkml:channel name="Y" type="integer" min="-2.14748E9" max="2.14748E9" units="cm"/>
+          <inkml:channel name="F" type="integer" max="32767" units="dev"/>
+        </inkml:traceFormat>
+        <inkml:channelProperties>
+          <inkml:channelProperty channel="X" name="resolution" value="1000" units="1/cm"/>
+          <inkml:channelProperty channel="Y" name="resolution" value="1000" units="1/cm"/>
+          <inkml:channelProperty channel="F" name="resolution" value="0" units="1/dev"/>
+        </inkml:channelProperties>
+      </inkml:inkSource>
+      <inkml:timestamp xml:id="ts0" timeString="2020-11-19T23:19:11.555"/>
+    </inkml:context>
+    <inkml:brush xml:id="br0">
+      <inkml:brushProperty name="width" value="0.35" units="cm"/>
+      <inkml:brushProperty name="height" value="0.35" units="cm"/>
+      <inkml:brushProperty name="color" value="#FFFFFF"/>
+    </inkml:brush>
+  </inkml:definitions>
+  <inkml:trace contextRef="#ctx0" brushRef="#br0">0 0 24575,'0'0'0</inkml:trace>
+</inkml:ink>
+</file>
+
+<file path=ppt/ink/ink46.xml><?xml version="1.0" encoding="utf-8"?>
+<inkml:ink xmlns:inkml="http://www.w3.org/2003/InkML">
+  <inkml:definitions>
+    <inkml:context xml:id="ctx0">
+      <inkml:inkSource xml:id="inkSrc0">
+        <inkml:traceFormat>
+          <inkml:channel name="X" type="integer" min="-2.14748E9" max="2.14748E9" units="cm"/>
+          <inkml:channel name="Y" type="integer" min="-2.14748E9" max="2.14748E9" units="cm"/>
+          <inkml:channel name="F" type="integer" max="32767" units="dev"/>
+        </inkml:traceFormat>
+        <inkml:channelProperties>
+          <inkml:channelProperty channel="X" name="resolution" value="1000" units="1/cm"/>
+          <inkml:channelProperty channel="Y" name="resolution" value="1000" units="1/cm"/>
+          <inkml:channelProperty channel="F" name="resolution" value="0" units="1/dev"/>
+        </inkml:channelProperties>
+      </inkml:inkSource>
+      <inkml:timestamp xml:id="ts0" timeString="2020-11-19T23:19:14.165"/>
+    </inkml:context>
+    <inkml:brush xml:id="br0">
+      <inkml:brushProperty name="width" value="0.35" units="cm"/>
+      <inkml:brushProperty name="height" value="0.35" units="cm"/>
+      <inkml:brushProperty name="color" value="#FFFFFF"/>
+    </inkml:brush>
+  </inkml:definitions>
+  <inkml:trace contextRef="#ctx0" brushRef="#br0">0 0 24575,'0'0'0</inkml:trace>
+</inkml:ink>
+</file>
+
+<file path=ppt/ink/ink47.xml><?xml version="1.0" encoding="utf-8"?>
+<inkml:ink xmlns:inkml="http://www.w3.org/2003/InkML">
+  <inkml:definitions>
+    <inkml:context xml:id="ctx0">
+      <inkml:inkSource xml:id="inkSrc0">
+        <inkml:traceFormat>
+          <inkml:channel name="X" type="integer" min="-2.14748E9" max="2.14748E9" units="cm"/>
+          <inkml:channel name="Y" type="integer" min="-2.14748E9" max="2.14748E9" units="cm"/>
+          <inkml:channel name="F" type="integer" max="32767" units="dev"/>
+        </inkml:traceFormat>
+        <inkml:channelProperties>
+          <inkml:channelProperty channel="X" name="resolution" value="1000" units="1/cm"/>
+          <inkml:channelProperty channel="Y" name="resolution" value="1000" units="1/cm"/>
+          <inkml:channelProperty channel="F" name="resolution" value="0" units="1/dev"/>
+        </inkml:channelProperties>
+      </inkml:inkSource>
+      <inkml:timestamp xml:id="ts0" timeString="2020-11-19T23:19:18.137"/>
+    </inkml:context>
+    <inkml:brush xml:id="br0">
+      <inkml:brushProperty name="width" value="0.35" units="cm"/>
+      <inkml:brushProperty name="height" value="0.35" units="cm"/>
+      <inkml:brushProperty name="color" value="#FFFFFF"/>
+    </inkml:brush>
+  </inkml:definitions>
+  <inkml:trace contextRef="#ctx0" brushRef="#br0">0 0 24575,'0'0'0</inkml:trace>
+</inkml:ink>
+</file>
+
+<file path=ppt/ink/ink48.xml><?xml version="1.0" encoding="utf-8"?>
+<inkml:ink xmlns:inkml="http://www.w3.org/2003/InkML">
+  <inkml:definitions>
+    <inkml:context xml:id="ctx0">
+      <inkml:inkSource xml:id="inkSrc0">
+        <inkml:traceFormat>
+          <inkml:channel name="X" type="integer" min="-2.14748E9" max="2.14748E9" units="cm"/>
+          <inkml:channel name="Y" type="integer" min="-2.14748E9" max="2.14748E9" units="cm"/>
+          <inkml:channel name="F" type="integer" max="32767" units="dev"/>
+        </inkml:traceFormat>
+        <inkml:channelProperties>
+          <inkml:channelProperty channel="X" name="resolution" value="1000" units="1/cm"/>
+          <inkml:channelProperty channel="Y" name="resolution" value="1000" units="1/cm"/>
+          <inkml:channelProperty channel="F" name="resolution" value="0" units="1/dev"/>
+        </inkml:channelProperties>
+      </inkml:inkSource>
+      <inkml:timestamp xml:id="ts0" timeString="2020-11-19T23:19:25.483"/>
+    </inkml:context>
+    <inkml:brush xml:id="br0">
+      <inkml:brushProperty name="width" value="0.35" units="cm"/>
+      <inkml:brushProperty name="height" value="0.35" units="cm"/>
+      <inkml:brushProperty name="color" value="#FFFFFF"/>
+    </inkml:brush>
+  </inkml:definitions>
+  <inkml:trace contextRef="#ctx0" brushRef="#br0">92 23 24575,'-30'3'0,"7"0"0,13-2 0,-1 1 0,5 0 0,-6 0 0,38-1 0,-21 0 0,29 0 0,-26-1 0,5-2 0,1 2 0,3-4 0,-3 2 0,1 0 0,-8 0 0,3 2 0,-2 0 0,5 0 0,4-1 0,-3 0 0,-1-1 0,-8 1 0,7-1 0,-2-7 0,1 6 0,-2-5 0,-33 16 0,18-7 0,-22 8 0,19-7 0,5 1 0,-9 2 0,7 0 0,-3 0 0,-1-1 0,3 1 0,-5-2 0,5 0 0,-1 0 0,-1-2 0,-3-3 0,-2 1 0,-5-5 0,7 3 0,0-1 0,5 1 0,-1 3 0,-1-3 0,27 18 0,-16-11 0,24 14 0,-11 3 0,8 14 0,13 10 0,1 2 0,-14-19 0,-8-9 0,-11-15 0,4-7 0,3 0 0,3-3 0,1 4 0,-6-1 0,0 3 0,9-11 0,1 5 0,2-5 0,-4 6 0,-12 1 0,-1 0 0,3-4 0,2 2 0,0-2 0,-2 2 0,-1 0 0,-1-3 0,-2 2 0,2-2 0,-2-2 0,1 4 0,-2-4 0,-1 6 0</inkml:trace>
+</inkml:ink>
+</file>
+
+<file path=ppt/ink/ink49.xml><?xml version="1.0" encoding="utf-8"?>
+<inkml:ink xmlns:inkml="http://www.w3.org/2003/InkML">
+  <inkml:definitions>
+    <inkml:context xml:id="ctx0">
+      <inkml:inkSource xml:id="inkSrc0">
+        <inkml:traceFormat>
+          <inkml:channel name="X" type="integer" min="-2.14748E9" max="2.14748E9" units="cm"/>
+          <inkml:channel name="Y" type="integer" min="-2.14748E9" max="2.14748E9" units="cm"/>
+          <inkml:channel name="F" type="integer" max="32767" units="dev"/>
+        </inkml:traceFormat>
+        <inkml:channelProperties>
+          <inkml:channelProperty channel="X" name="resolution" value="1000" units="1/cm"/>
+          <inkml:channelProperty channel="Y" name="resolution" value="1000" units="1/cm"/>
+          <inkml:channelProperty channel="F" name="resolution" value="0" units="1/dev"/>
+        </inkml:channelProperties>
+      </inkml:inkSource>
+      <inkml:timestamp xml:id="ts0" timeString="2020-11-19T23:19:29.578"/>
+    </inkml:context>
+    <inkml:brush xml:id="br0">
+      <inkml:brushProperty name="width" value="0.35" units="cm"/>
+      <inkml:brushProperty name="height" value="0.35" units="cm"/>
+      <inkml:brushProperty name="color" value="#FFFFFF"/>
+    </inkml:brush>
+  </inkml:definitions>
+  <inkml:trace contextRef="#ctx0" brushRef="#br0">1 1 24575,'7'35'0,"0"-5"0,-4-2 0,0-9 0,-1-4 0,0-5 0,12-27 0,-9 10 0,8-23 0,-11 16 0,-1 1 0,0 4 0,-5 33 0,2-14 0,-2 19 0,6-24 0,12-3 0,-5 0 0,5 1 0,-6-1 0,-1 2 0,1 3 0,2 0 0,-3 2 0,1-3 0,-3 1 0,4 2 0,1 9 0,2-5 0,-5 1 0,-2-10 0,-13-28 0,5 9 0,-9-22 0,6 21 0,2 7 0,18 32 0,-5-11 0,13 21 0,-10-32 0,2-1 0,5-15 0,-5 8 0,-2-7 0,-7 7 0,-3 2 0,4-6 0,4 24 0,-3-16 0,5 16 0,-3-17 0,1-3 0</inkml:trace>
 </inkml:ink>
 </file>
 
@@ -1073,6 +1390,286 @@
 </inkml:ink>
 </file>
 
+<file path=ppt/ink/ink50.xml><?xml version="1.0" encoding="utf-8"?>
+<inkml:ink xmlns:inkml="http://www.w3.org/2003/InkML">
+  <inkml:definitions>
+    <inkml:context xml:id="ctx0">
+      <inkml:inkSource xml:id="inkSrc0">
+        <inkml:traceFormat>
+          <inkml:channel name="X" type="integer" min="-2.14748E9" max="2.14748E9" units="cm"/>
+          <inkml:channel name="Y" type="integer" min="-2.14748E9" max="2.14748E9" units="cm"/>
+          <inkml:channel name="F" type="integer" max="32767" units="dev"/>
+        </inkml:traceFormat>
+        <inkml:channelProperties>
+          <inkml:channelProperty channel="X" name="resolution" value="1000" units="1/cm"/>
+          <inkml:channelProperty channel="Y" name="resolution" value="1000" units="1/cm"/>
+          <inkml:channelProperty channel="F" name="resolution" value="0" units="1/dev"/>
+        </inkml:channelProperties>
+      </inkml:inkSource>
+      <inkml:timestamp xml:id="ts0" timeString="2020-11-19T23:19:47.567"/>
+    </inkml:context>
+    <inkml:brush xml:id="br0">
+      <inkml:brushProperty name="width" value="0.35" units="cm"/>
+      <inkml:brushProperty name="height" value="0.35" units="cm"/>
+      <inkml:brushProperty name="color" value="#FFFFFF"/>
+    </inkml:brush>
+  </inkml:definitions>
+  <inkml:trace contextRef="#ctx0" brushRef="#br0">518 128 24575,'-15'38'0,"-5"3"0,-1-1 0,-14 22 0,4-2 0,-3 21 0,10-15 0,8-19 0,7-21 0,12-29 0,12-26 0,4 3 0,8-11 0,-5 4 0,-6 7 0,-4-19 0,-7 7 0,-3 5 0,-3 12 0,-12 28 0,-5 9 0,-8 8 0,7-2 0,8-11 0,7-14 0,4-19 0,0-6 0,2-6 0,1-11 0,0-14 0,-1-11 0,-2 4 0,0 31 0,0 19 0,-6 53 0,0-17 0,-8 38 0,3-8 0,0 12 0,4 2 0,5-20 0,2-19 0,1-17 0,-17-15 0,12 5 0,-13-7 0,8 18 0,4-6 0,-5 6 0,-2-6 0,8-1 0,-10 3 0,6-5 0,-6 2 0,-9 2 0,-13 2 0,1 8 0,-2-4 0,19 1 0,7-7 0,5-1 0,-1-1 0,-2 1 0</inkml:trace>
+</inkml:ink>
+</file>
+
+<file path=ppt/ink/ink51.xml><?xml version="1.0" encoding="utf-8"?>
+<inkml:ink xmlns:inkml="http://www.w3.org/2003/InkML">
+  <inkml:definitions>
+    <inkml:context xml:id="ctx0">
+      <inkml:inkSource xml:id="inkSrc0">
+        <inkml:traceFormat>
+          <inkml:channel name="X" type="integer" min="-2.14748E9" max="2.14748E9" units="cm"/>
+          <inkml:channel name="Y" type="integer" min="-2.14748E9" max="2.14748E9" units="cm"/>
+          <inkml:channel name="F" type="integer" max="32767" units="dev"/>
+        </inkml:traceFormat>
+        <inkml:channelProperties>
+          <inkml:channelProperty channel="X" name="resolution" value="1000" units="1/cm"/>
+          <inkml:channelProperty channel="Y" name="resolution" value="1000" units="1/cm"/>
+          <inkml:channelProperty channel="F" name="resolution" value="0" units="1/dev"/>
+        </inkml:channelProperties>
+      </inkml:inkSource>
+      <inkml:timestamp xml:id="ts0" timeString="2020-11-19T23:19:50.098"/>
+    </inkml:context>
+    <inkml:brush xml:id="br0">
+      <inkml:brushProperty name="width" value="0.35" units="cm"/>
+      <inkml:brushProperty name="height" value="0.35" units="cm"/>
+      <inkml:brushProperty name="color" value="#FFFFFF"/>
+    </inkml:brush>
+  </inkml:definitions>
+  <inkml:trace contextRef="#ctx0" brushRef="#br0">0 0 24575,'0'0'0</inkml:trace>
+</inkml:ink>
+</file>
+
+<file path=ppt/ink/ink52.xml><?xml version="1.0" encoding="utf-8"?>
+<inkml:ink xmlns:inkml="http://www.w3.org/2003/InkML">
+  <inkml:definitions>
+    <inkml:context xml:id="ctx0">
+      <inkml:inkSource xml:id="inkSrc0">
+        <inkml:traceFormat>
+          <inkml:channel name="X" type="integer" min="-2.14748E9" max="2.14748E9" units="cm"/>
+          <inkml:channel name="Y" type="integer" min="-2.14748E9" max="2.14748E9" units="cm"/>
+          <inkml:channel name="F" type="integer" max="32767" units="dev"/>
+        </inkml:traceFormat>
+        <inkml:channelProperties>
+          <inkml:channelProperty channel="X" name="resolution" value="1000" units="1/cm"/>
+          <inkml:channelProperty channel="Y" name="resolution" value="1000" units="1/cm"/>
+          <inkml:channelProperty channel="F" name="resolution" value="0" units="1/dev"/>
+        </inkml:channelProperties>
+      </inkml:inkSource>
+      <inkml:timestamp xml:id="ts0" timeString="2020-11-19T23:19:50.447"/>
+    </inkml:context>
+    <inkml:brush xml:id="br0">
+      <inkml:brushProperty name="width" value="0.35" units="cm"/>
+      <inkml:brushProperty name="height" value="0.35" units="cm"/>
+      <inkml:brushProperty name="color" value="#FFFFFF"/>
+    </inkml:brush>
+  </inkml:definitions>
+  <inkml:trace contextRef="#ctx0" brushRef="#br0">0 1 24575,'0'0'0</inkml:trace>
+</inkml:ink>
+</file>
+
+<file path=ppt/ink/ink53.xml><?xml version="1.0" encoding="utf-8"?>
+<inkml:ink xmlns:inkml="http://www.w3.org/2003/InkML">
+  <inkml:definitions>
+    <inkml:context xml:id="ctx0">
+      <inkml:inkSource xml:id="inkSrc0">
+        <inkml:traceFormat>
+          <inkml:channel name="X" type="integer" min="-2.14748E9" max="2.14748E9" units="cm"/>
+          <inkml:channel name="Y" type="integer" min="-2.14748E9" max="2.14748E9" units="cm"/>
+          <inkml:channel name="F" type="integer" max="32767" units="dev"/>
+        </inkml:traceFormat>
+        <inkml:channelProperties>
+          <inkml:channelProperty channel="X" name="resolution" value="1000" units="1/cm"/>
+          <inkml:channelProperty channel="Y" name="resolution" value="1000" units="1/cm"/>
+          <inkml:channelProperty channel="F" name="resolution" value="0" units="1/dev"/>
+        </inkml:channelProperties>
+      </inkml:inkSource>
+      <inkml:timestamp xml:id="ts0" timeString="2020-11-19T23:19:52.371"/>
+    </inkml:context>
+    <inkml:brush xml:id="br0">
+      <inkml:brushProperty name="width" value="0.35" units="cm"/>
+      <inkml:brushProperty name="height" value="0.35" units="cm"/>
+      <inkml:brushProperty name="color" value="#FFFFFF"/>
+    </inkml:brush>
+  </inkml:definitions>
+  <inkml:trace contextRef="#ctx0" brushRef="#br0">1 1 24575,'0'0'0</inkml:trace>
+</inkml:ink>
+</file>
+
+<file path=ppt/ink/ink54.xml><?xml version="1.0" encoding="utf-8"?>
+<inkml:ink xmlns:inkml="http://www.w3.org/2003/InkML">
+  <inkml:definitions>
+    <inkml:context xml:id="ctx0">
+      <inkml:inkSource xml:id="inkSrc0">
+        <inkml:traceFormat>
+          <inkml:channel name="X" type="integer" min="-2.14748E9" max="2.14748E9" units="cm"/>
+          <inkml:channel name="Y" type="integer" min="-2.14748E9" max="2.14748E9" units="cm"/>
+          <inkml:channel name="F" type="integer" max="32767" units="dev"/>
+        </inkml:traceFormat>
+        <inkml:channelProperties>
+          <inkml:channelProperty channel="X" name="resolution" value="1000" units="1/cm"/>
+          <inkml:channelProperty channel="Y" name="resolution" value="1000" units="1/cm"/>
+          <inkml:channelProperty channel="F" name="resolution" value="0" units="1/dev"/>
+        </inkml:channelProperties>
+      </inkml:inkSource>
+      <inkml:timestamp xml:id="ts0" timeString="2020-11-19T23:19:52.652"/>
+    </inkml:context>
+    <inkml:brush xml:id="br0">
+      <inkml:brushProperty name="width" value="0.35" units="cm"/>
+      <inkml:brushProperty name="height" value="0.35" units="cm"/>
+      <inkml:brushProperty name="color" value="#FFFFFF"/>
+    </inkml:brush>
+  </inkml:definitions>
+  <inkml:trace contextRef="#ctx0" brushRef="#br0">1 1 24575,'0'0'0</inkml:trace>
+</inkml:ink>
+</file>
+
+<file path=ppt/ink/ink55.xml><?xml version="1.0" encoding="utf-8"?>
+<inkml:ink xmlns:inkml="http://www.w3.org/2003/InkML">
+  <inkml:definitions>
+    <inkml:context xml:id="ctx0">
+      <inkml:inkSource xml:id="inkSrc0">
+        <inkml:traceFormat>
+          <inkml:channel name="X" type="integer" min="-2.14748E9" max="2.14748E9" units="cm"/>
+          <inkml:channel name="Y" type="integer" min="-2.14748E9" max="2.14748E9" units="cm"/>
+          <inkml:channel name="F" type="integer" max="32767" units="dev"/>
+        </inkml:traceFormat>
+        <inkml:channelProperties>
+          <inkml:channelProperty channel="X" name="resolution" value="1000" units="1/cm"/>
+          <inkml:channelProperty channel="Y" name="resolution" value="1000" units="1/cm"/>
+          <inkml:channelProperty channel="F" name="resolution" value="0" units="1/dev"/>
+        </inkml:channelProperties>
+      </inkml:inkSource>
+      <inkml:timestamp xml:id="ts0" timeString="2020-11-19T23:19:53.676"/>
+    </inkml:context>
+    <inkml:brush xml:id="br0">
+      <inkml:brushProperty name="width" value="0.35" units="cm"/>
+      <inkml:brushProperty name="height" value="0.35" units="cm"/>
+      <inkml:brushProperty name="color" value="#FFFFFF"/>
+    </inkml:brush>
+  </inkml:definitions>
+  <inkml:trace contextRef="#ctx0" brushRef="#br0">0 1 24575,'0'0'0</inkml:trace>
+</inkml:ink>
+</file>
+
+<file path=ppt/ink/ink56.xml><?xml version="1.0" encoding="utf-8"?>
+<inkml:ink xmlns:inkml="http://www.w3.org/2003/InkML">
+  <inkml:definitions>
+    <inkml:context xml:id="ctx0">
+      <inkml:inkSource xml:id="inkSrc0">
+        <inkml:traceFormat>
+          <inkml:channel name="X" type="integer" min="-2.14748E9" max="2.14748E9" units="cm"/>
+          <inkml:channel name="Y" type="integer" min="-2.14748E9" max="2.14748E9" units="cm"/>
+          <inkml:channel name="F" type="integer" max="32767" units="dev"/>
+        </inkml:traceFormat>
+        <inkml:channelProperties>
+          <inkml:channelProperty channel="X" name="resolution" value="1000" units="1/cm"/>
+          <inkml:channelProperty channel="Y" name="resolution" value="1000" units="1/cm"/>
+          <inkml:channelProperty channel="F" name="resolution" value="0" units="1/dev"/>
+        </inkml:channelProperties>
+      </inkml:inkSource>
+      <inkml:timestamp xml:id="ts0" timeString="2020-11-19T23:19:53.867"/>
+    </inkml:context>
+    <inkml:brush xml:id="br0">
+      <inkml:brushProperty name="width" value="0.35" units="cm"/>
+      <inkml:brushProperty name="height" value="0.35" units="cm"/>
+      <inkml:brushProperty name="color" value="#FFFFFF"/>
+    </inkml:brush>
+  </inkml:definitions>
+  <inkml:trace contextRef="#ctx0" brushRef="#br0">0 1 24575,'0'0'0</inkml:trace>
+</inkml:ink>
+</file>
+
+<file path=ppt/ink/ink57.xml><?xml version="1.0" encoding="utf-8"?>
+<inkml:ink xmlns:inkml="http://www.w3.org/2003/InkML">
+  <inkml:definitions>
+    <inkml:context xml:id="ctx0">
+      <inkml:inkSource xml:id="inkSrc0">
+        <inkml:traceFormat>
+          <inkml:channel name="X" type="integer" min="-2.14748E9" max="2.14748E9" units="cm"/>
+          <inkml:channel name="Y" type="integer" min="-2.14748E9" max="2.14748E9" units="cm"/>
+          <inkml:channel name="F" type="integer" max="32767" units="dev"/>
+        </inkml:traceFormat>
+        <inkml:channelProperties>
+          <inkml:channelProperty channel="X" name="resolution" value="1000" units="1/cm"/>
+          <inkml:channelProperty channel="Y" name="resolution" value="1000" units="1/cm"/>
+          <inkml:channelProperty channel="F" name="resolution" value="0" units="1/dev"/>
+        </inkml:channelProperties>
+      </inkml:inkSource>
+      <inkml:timestamp xml:id="ts0" timeString="2020-11-19T23:19:57.489"/>
+    </inkml:context>
+    <inkml:brush xml:id="br0">
+      <inkml:brushProperty name="width" value="0.35" units="cm"/>
+      <inkml:brushProperty name="height" value="0.35" units="cm"/>
+      <inkml:brushProperty name="color" value="#FFFFFF"/>
+    </inkml:brush>
+  </inkml:definitions>
+  <inkml:trace contextRef="#ctx0" brushRef="#br0">0 0 24575,'0'0'0</inkml:trace>
+</inkml:ink>
+</file>
+
+<file path=ppt/ink/ink58.xml><?xml version="1.0" encoding="utf-8"?>
+<inkml:ink xmlns:inkml="http://www.w3.org/2003/InkML">
+  <inkml:definitions>
+    <inkml:context xml:id="ctx0">
+      <inkml:inkSource xml:id="inkSrc0">
+        <inkml:traceFormat>
+          <inkml:channel name="X" type="integer" min="-2.14748E9" max="2.14748E9" units="cm"/>
+          <inkml:channel name="Y" type="integer" min="-2.14748E9" max="2.14748E9" units="cm"/>
+          <inkml:channel name="F" type="integer" max="32767" units="dev"/>
+        </inkml:traceFormat>
+        <inkml:channelProperties>
+          <inkml:channelProperty channel="X" name="resolution" value="1000" units="1/cm"/>
+          <inkml:channelProperty channel="Y" name="resolution" value="1000" units="1/cm"/>
+          <inkml:channelProperty channel="F" name="resolution" value="0" units="1/dev"/>
+        </inkml:channelProperties>
+      </inkml:inkSource>
+      <inkml:timestamp xml:id="ts0" timeString="2020-11-19T23:19:57.726"/>
+    </inkml:context>
+    <inkml:brush xml:id="br0">
+      <inkml:brushProperty name="width" value="0.35" units="cm"/>
+      <inkml:brushProperty name="height" value="0.35" units="cm"/>
+      <inkml:brushProperty name="color" value="#FFFFFF"/>
+    </inkml:brush>
+  </inkml:definitions>
+  <inkml:trace contextRef="#ctx0" brushRef="#br0">1 0 24575,'0'0'0</inkml:trace>
+</inkml:ink>
+</file>
+
+<file path=ppt/ink/ink59.xml><?xml version="1.0" encoding="utf-8"?>
+<inkml:ink xmlns:inkml="http://www.w3.org/2003/InkML">
+  <inkml:definitions>
+    <inkml:context xml:id="ctx0">
+      <inkml:inkSource xml:id="inkSrc0">
+        <inkml:traceFormat>
+          <inkml:channel name="X" type="integer" min="-2.14748E9" max="2.14748E9" units="cm"/>
+          <inkml:channel name="Y" type="integer" min="-2.14748E9" max="2.14748E9" units="cm"/>
+          <inkml:channel name="F" type="integer" max="32767" units="dev"/>
+        </inkml:traceFormat>
+        <inkml:channelProperties>
+          <inkml:channelProperty channel="X" name="resolution" value="1000" units="1/cm"/>
+          <inkml:channelProperty channel="Y" name="resolution" value="1000" units="1/cm"/>
+          <inkml:channelProperty channel="F" name="resolution" value="0" units="1/dev"/>
+        </inkml:channelProperties>
+      </inkml:inkSource>
+      <inkml:timestamp xml:id="ts0" timeString="2020-11-19T23:19:59.200"/>
+    </inkml:context>
+    <inkml:brush xml:id="br0">
+      <inkml:brushProperty name="width" value="0.35" units="cm"/>
+      <inkml:brushProperty name="height" value="0.35" units="cm"/>
+      <inkml:brushProperty name="color" value="#FFFFFF"/>
+    </inkml:brush>
+  </inkml:definitions>
+  <inkml:trace contextRef="#ctx0" brushRef="#br0">0 0 24575,'0'0'0</inkml:trace>
+</inkml:ink>
+</file>
+
 <file path=ppt/ink/ink6.xml><?xml version="1.0" encoding="utf-8"?>
 <inkml:ink xmlns:inkml="http://www.w3.org/2003/InkML">
   <inkml:definitions>
@@ -1101,6 +1698,286 @@
 </inkml:ink>
 </file>
 
+<file path=ppt/ink/ink60.xml><?xml version="1.0" encoding="utf-8"?>
+<inkml:ink xmlns:inkml="http://www.w3.org/2003/InkML">
+  <inkml:definitions>
+    <inkml:context xml:id="ctx0">
+      <inkml:inkSource xml:id="inkSrc0">
+        <inkml:traceFormat>
+          <inkml:channel name="X" type="integer" min="-2.14748E9" max="2.14748E9" units="cm"/>
+          <inkml:channel name="Y" type="integer" min="-2.14748E9" max="2.14748E9" units="cm"/>
+          <inkml:channel name="F" type="integer" max="32767" units="dev"/>
+        </inkml:traceFormat>
+        <inkml:channelProperties>
+          <inkml:channelProperty channel="X" name="resolution" value="1000" units="1/cm"/>
+          <inkml:channelProperty channel="Y" name="resolution" value="1000" units="1/cm"/>
+          <inkml:channelProperty channel="F" name="resolution" value="0" units="1/dev"/>
+        </inkml:channelProperties>
+      </inkml:inkSource>
+      <inkml:timestamp xml:id="ts0" timeString="2020-11-19T23:19:59.426"/>
+    </inkml:context>
+    <inkml:brush xml:id="br0">
+      <inkml:brushProperty name="width" value="0.35" units="cm"/>
+      <inkml:brushProperty name="height" value="0.35" units="cm"/>
+      <inkml:brushProperty name="color" value="#FFFFFF"/>
+    </inkml:brush>
+  </inkml:definitions>
+  <inkml:trace contextRef="#ctx0" brushRef="#br0">0 1 24575,'0'0'0</inkml:trace>
+</inkml:ink>
+</file>
+
+<file path=ppt/ink/ink61.xml><?xml version="1.0" encoding="utf-8"?>
+<inkml:ink xmlns:inkml="http://www.w3.org/2003/InkML">
+  <inkml:definitions>
+    <inkml:context xml:id="ctx0">
+      <inkml:inkSource xml:id="inkSrc0">
+        <inkml:traceFormat>
+          <inkml:channel name="X" type="integer" min="-2.14748E9" max="2.14748E9" units="cm"/>
+          <inkml:channel name="Y" type="integer" min="-2.14748E9" max="2.14748E9" units="cm"/>
+          <inkml:channel name="F" type="integer" max="32767" units="dev"/>
+        </inkml:traceFormat>
+        <inkml:channelProperties>
+          <inkml:channelProperty channel="X" name="resolution" value="1000" units="1/cm"/>
+          <inkml:channelProperty channel="Y" name="resolution" value="1000" units="1/cm"/>
+          <inkml:channelProperty channel="F" name="resolution" value="0" units="1/dev"/>
+        </inkml:channelProperties>
+      </inkml:inkSource>
+      <inkml:timestamp xml:id="ts0" timeString="2020-11-19T23:20:00.336"/>
+    </inkml:context>
+    <inkml:brush xml:id="br0">
+      <inkml:brushProperty name="width" value="0.35" units="cm"/>
+      <inkml:brushProperty name="height" value="0.35" units="cm"/>
+      <inkml:brushProperty name="color" value="#FFFFFF"/>
+    </inkml:brush>
+  </inkml:definitions>
+  <inkml:trace contextRef="#ctx0" brushRef="#br0">1 1 24575,'0'0'0</inkml:trace>
+</inkml:ink>
+</file>
+
+<file path=ppt/ink/ink62.xml><?xml version="1.0" encoding="utf-8"?>
+<inkml:ink xmlns:inkml="http://www.w3.org/2003/InkML">
+  <inkml:definitions>
+    <inkml:context xml:id="ctx0">
+      <inkml:inkSource xml:id="inkSrc0">
+        <inkml:traceFormat>
+          <inkml:channel name="X" type="integer" min="-2.14748E9" max="2.14748E9" units="cm"/>
+          <inkml:channel name="Y" type="integer" min="-2.14748E9" max="2.14748E9" units="cm"/>
+          <inkml:channel name="F" type="integer" max="32767" units="dev"/>
+        </inkml:traceFormat>
+        <inkml:channelProperties>
+          <inkml:channelProperty channel="X" name="resolution" value="1000" units="1/cm"/>
+          <inkml:channelProperty channel="Y" name="resolution" value="1000" units="1/cm"/>
+          <inkml:channelProperty channel="F" name="resolution" value="0" units="1/dev"/>
+        </inkml:channelProperties>
+      </inkml:inkSource>
+      <inkml:timestamp xml:id="ts0" timeString="2020-11-19T23:20:00.538"/>
+    </inkml:context>
+    <inkml:brush xml:id="br0">
+      <inkml:brushProperty name="width" value="0.35" units="cm"/>
+      <inkml:brushProperty name="height" value="0.35" units="cm"/>
+      <inkml:brushProperty name="color" value="#FFFFFF"/>
+    </inkml:brush>
+  </inkml:definitions>
+  <inkml:trace contextRef="#ctx0" brushRef="#br0">0 0 24575,'0'0'0</inkml:trace>
+</inkml:ink>
+</file>
+
+<file path=ppt/ink/ink63.xml><?xml version="1.0" encoding="utf-8"?>
+<inkml:ink xmlns:inkml="http://www.w3.org/2003/InkML">
+  <inkml:definitions>
+    <inkml:context xml:id="ctx0">
+      <inkml:inkSource xml:id="inkSrc0">
+        <inkml:traceFormat>
+          <inkml:channel name="X" type="integer" min="-2.14748E9" max="2.14748E9" units="cm"/>
+          <inkml:channel name="Y" type="integer" min="-2.14748E9" max="2.14748E9" units="cm"/>
+          <inkml:channel name="F" type="integer" max="32767" units="dev"/>
+        </inkml:traceFormat>
+        <inkml:channelProperties>
+          <inkml:channelProperty channel="X" name="resolution" value="1000" units="1/cm"/>
+          <inkml:channelProperty channel="Y" name="resolution" value="1000" units="1/cm"/>
+          <inkml:channelProperty channel="F" name="resolution" value="0" units="1/dev"/>
+        </inkml:channelProperties>
+      </inkml:inkSource>
+      <inkml:timestamp xml:id="ts0" timeString="2020-11-19T23:20:27.134"/>
+    </inkml:context>
+    <inkml:brush xml:id="br0">
+      <inkml:brushProperty name="width" value="0.35" units="cm"/>
+      <inkml:brushProperty name="height" value="0.35" units="cm"/>
+      <inkml:brushProperty name="color" value="#FFFFFF"/>
+    </inkml:brush>
+  </inkml:definitions>
+  <inkml:trace contextRef="#ctx0" brushRef="#br0">0 0 24575,'0'0'0</inkml:trace>
+</inkml:ink>
+</file>
+
+<file path=ppt/ink/ink64.xml><?xml version="1.0" encoding="utf-8"?>
+<inkml:ink xmlns:inkml="http://www.w3.org/2003/InkML">
+  <inkml:definitions>
+    <inkml:context xml:id="ctx0">
+      <inkml:inkSource xml:id="inkSrc0">
+        <inkml:traceFormat>
+          <inkml:channel name="X" type="integer" min="-2.14748E9" max="2.14748E9" units="cm"/>
+          <inkml:channel name="Y" type="integer" min="-2.14748E9" max="2.14748E9" units="cm"/>
+          <inkml:channel name="F" type="integer" max="32767" units="dev"/>
+        </inkml:traceFormat>
+        <inkml:channelProperties>
+          <inkml:channelProperty channel="X" name="resolution" value="1000" units="1/cm"/>
+          <inkml:channelProperty channel="Y" name="resolution" value="1000" units="1/cm"/>
+          <inkml:channelProperty channel="F" name="resolution" value="0" units="1/dev"/>
+        </inkml:channelProperties>
+      </inkml:inkSource>
+      <inkml:timestamp xml:id="ts0" timeString="2020-11-19T23:20:27.325"/>
+    </inkml:context>
+    <inkml:brush xml:id="br0">
+      <inkml:brushProperty name="width" value="0.35" units="cm"/>
+      <inkml:brushProperty name="height" value="0.35" units="cm"/>
+      <inkml:brushProperty name="color" value="#FFFFFF"/>
+    </inkml:brush>
+  </inkml:definitions>
+  <inkml:trace contextRef="#ctx0" brushRef="#br0">0 0 24575,'0'0'0</inkml:trace>
+</inkml:ink>
+</file>
+
+<file path=ppt/ink/ink65.xml><?xml version="1.0" encoding="utf-8"?>
+<inkml:ink xmlns:inkml="http://www.w3.org/2003/InkML">
+  <inkml:definitions>
+    <inkml:context xml:id="ctx0">
+      <inkml:inkSource xml:id="inkSrc0">
+        <inkml:traceFormat>
+          <inkml:channel name="X" type="integer" min="-2.14748E9" max="2.14748E9" units="cm"/>
+          <inkml:channel name="Y" type="integer" min="-2.14748E9" max="2.14748E9" units="cm"/>
+          <inkml:channel name="F" type="integer" max="32767" units="dev"/>
+        </inkml:traceFormat>
+        <inkml:channelProperties>
+          <inkml:channelProperty channel="X" name="resolution" value="1000" units="1/cm"/>
+          <inkml:channelProperty channel="Y" name="resolution" value="1000" units="1/cm"/>
+          <inkml:channelProperty channel="F" name="resolution" value="0" units="1/dev"/>
+        </inkml:channelProperties>
+      </inkml:inkSource>
+      <inkml:timestamp xml:id="ts0" timeString="2020-11-19T23:20:29.699"/>
+    </inkml:context>
+    <inkml:brush xml:id="br0">
+      <inkml:brushProperty name="width" value="0.35" units="cm"/>
+      <inkml:brushProperty name="height" value="0.35" units="cm"/>
+      <inkml:brushProperty name="color" value="#FFFFFF"/>
+    </inkml:brush>
+  </inkml:definitions>
+  <inkml:trace contextRef="#ctx0" brushRef="#br0">1 1 24575,'0'0'0</inkml:trace>
+</inkml:ink>
+</file>
+
+<file path=ppt/ink/ink66.xml><?xml version="1.0" encoding="utf-8"?>
+<inkml:ink xmlns:inkml="http://www.w3.org/2003/InkML">
+  <inkml:definitions>
+    <inkml:context xml:id="ctx0">
+      <inkml:inkSource xml:id="inkSrc0">
+        <inkml:traceFormat>
+          <inkml:channel name="X" type="integer" min="-2.14748E9" max="2.14748E9" units="cm"/>
+          <inkml:channel name="Y" type="integer" min="-2.14748E9" max="2.14748E9" units="cm"/>
+          <inkml:channel name="F" type="integer" max="32767" units="dev"/>
+        </inkml:traceFormat>
+        <inkml:channelProperties>
+          <inkml:channelProperty channel="X" name="resolution" value="1000" units="1/cm"/>
+          <inkml:channelProperty channel="Y" name="resolution" value="1000" units="1/cm"/>
+          <inkml:channelProperty channel="F" name="resolution" value="0" units="1/dev"/>
+        </inkml:channelProperties>
+      </inkml:inkSource>
+      <inkml:timestamp xml:id="ts0" timeString="2020-11-19T23:20:29.890"/>
+    </inkml:context>
+    <inkml:brush xml:id="br0">
+      <inkml:brushProperty name="width" value="0.35" units="cm"/>
+      <inkml:brushProperty name="height" value="0.35" units="cm"/>
+      <inkml:brushProperty name="color" value="#FFFFFF"/>
+    </inkml:brush>
+  </inkml:definitions>
+  <inkml:trace contextRef="#ctx0" brushRef="#br0">1 1 24575,'0'0'0</inkml:trace>
+</inkml:ink>
+</file>
+
+<file path=ppt/ink/ink67.xml><?xml version="1.0" encoding="utf-8"?>
+<inkml:ink xmlns:inkml="http://www.w3.org/2003/InkML">
+  <inkml:definitions>
+    <inkml:context xml:id="ctx0">
+      <inkml:inkSource xml:id="inkSrc0">
+        <inkml:traceFormat>
+          <inkml:channel name="X" type="integer" min="-2.14748E9" max="2.14748E9" units="cm"/>
+          <inkml:channel name="Y" type="integer" min="-2.14748E9" max="2.14748E9" units="cm"/>
+          <inkml:channel name="F" type="integer" max="32767" units="dev"/>
+        </inkml:traceFormat>
+        <inkml:channelProperties>
+          <inkml:channelProperty channel="X" name="resolution" value="1000" units="1/cm"/>
+          <inkml:channelProperty channel="Y" name="resolution" value="1000" units="1/cm"/>
+          <inkml:channelProperty channel="F" name="resolution" value="0" units="1/dev"/>
+        </inkml:channelProperties>
+      </inkml:inkSource>
+      <inkml:timestamp xml:id="ts0" timeString="2020-11-19T23:20:31.487"/>
+    </inkml:context>
+    <inkml:brush xml:id="br0">
+      <inkml:brushProperty name="width" value="0.35" units="cm"/>
+      <inkml:brushProperty name="height" value="0.35" units="cm"/>
+      <inkml:brushProperty name="color" value="#FFFFFF"/>
+    </inkml:brush>
+  </inkml:definitions>
+  <inkml:trace contextRef="#ctx0" brushRef="#br0">0 0 24575,'0'0'0</inkml:trace>
+</inkml:ink>
+</file>
+
+<file path=ppt/ink/ink68.xml><?xml version="1.0" encoding="utf-8"?>
+<inkml:ink xmlns:inkml="http://www.w3.org/2003/InkML">
+  <inkml:definitions>
+    <inkml:context xml:id="ctx0">
+      <inkml:inkSource xml:id="inkSrc0">
+        <inkml:traceFormat>
+          <inkml:channel name="X" type="integer" min="-2.14748E9" max="2.14748E9" units="cm"/>
+          <inkml:channel name="Y" type="integer" min="-2.14748E9" max="2.14748E9" units="cm"/>
+          <inkml:channel name="F" type="integer" max="32767" units="dev"/>
+        </inkml:traceFormat>
+        <inkml:channelProperties>
+          <inkml:channelProperty channel="X" name="resolution" value="1000" units="1/cm"/>
+          <inkml:channelProperty channel="Y" name="resolution" value="1000" units="1/cm"/>
+          <inkml:channelProperty channel="F" name="resolution" value="0" units="1/dev"/>
+        </inkml:channelProperties>
+      </inkml:inkSource>
+      <inkml:timestamp xml:id="ts0" timeString="2020-11-19T23:20:31.874"/>
+    </inkml:context>
+    <inkml:brush xml:id="br0">
+      <inkml:brushProperty name="width" value="0.35" units="cm"/>
+      <inkml:brushProperty name="height" value="0.35" units="cm"/>
+      <inkml:brushProperty name="color" value="#FFFFFF"/>
+    </inkml:brush>
+  </inkml:definitions>
+  <inkml:trace contextRef="#ctx0" brushRef="#br0">0 0 24575,'0'0'0</inkml:trace>
+</inkml:ink>
+</file>
+
+<file path=ppt/ink/ink69.xml><?xml version="1.0" encoding="utf-8"?>
+<inkml:ink xmlns:inkml="http://www.w3.org/2003/InkML">
+  <inkml:definitions>
+    <inkml:context xml:id="ctx0">
+      <inkml:inkSource xml:id="inkSrc0">
+        <inkml:traceFormat>
+          <inkml:channel name="X" type="integer" min="-2.14748E9" max="2.14748E9" units="cm"/>
+          <inkml:channel name="Y" type="integer" min="-2.14748E9" max="2.14748E9" units="cm"/>
+          <inkml:channel name="F" type="integer" max="32767" units="dev"/>
+        </inkml:traceFormat>
+        <inkml:channelProperties>
+          <inkml:channelProperty channel="X" name="resolution" value="1000" units="1/cm"/>
+          <inkml:channelProperty channel="Y" name="resolution" value="1000" units="1/cm"/>
+          <inkml:channelProperty channel="F" name="resolution" value="0" units="1/dev"/>
+        </inkml:channelProperties>
+      </inkml:inkSource>
+      <inkml:timestamp xml:id="ts0" timeString="2020-11-19T23:23:41.907"/>
+    </inkml:context>
+    <inkml:brush xml:id="br0">
+      <inkml:brushProperty name="width" value="0.35" units="cm"/>
+      <inkml:brushProperty name="height" value="0.35" units="cm"/>
+      <inkml:brushProperty name="color" value="#FFFFFF"/>
+    </inkml:brush>
+  </inkml:definitions>
+  <inkml:trace contextRef="#ctx0" brushRef="#br0">1 1 24575,'0'0'0</inkml:trace>
+</inkml:ink>
+</file>
+
 <file path=ppt/ink/ink7.xml><?xml version="1.0" encoding="utf-8"?>
 <inkml:ink xmlns:inkml="http://www.w3.org/2003/InkML">
   <inkml:definitions>
@@ -1126,6 +2003,34 @@
     </inkml:brush>
   </inkml:definitions>
   <inkml:trace contextRef="#ctx0" brushRef="#br0">0 0 24575,'0'0'0</inkml:trace>
+</inkml:ink>
+</file>
+
+<file path=ppt/ink/ink70.xml><?xml version="1.0" encoding="utf-8"?>
+<inkml:ink xmlns:inkml="http://www.w3.org/2003/InkML">
+  <inkml:definitions>
+    <inkml:context xml:id="ctx0">
+      <inkml:inkSource xml:id="inkSrc0">
+        <inkml:traceFormat>
+          <inkml:channel name="X" type="integer" min="-2.14748E9" max="2.14748E9" units="cm"/>
+          <inkml:channel name="Y" type="integer" min="-2.14748E9" max="2.14748E9" units="cm"/>
+          <inkml:channel name="F" type="integer" max="32767" units="dev"/>
+        </inkml:traceFormat>
+        <inkml:channelProperties>
+          <inkml:channelProperty channel="X" name="resolution" value="1000" units="1/cm"/>
+          <inkml:channelProperty channel="Y" name="resolution" value="1000" units="1/cm"/>
+          <inkml:channelProperty channel="F" name="resolution" value="0" units="1/dev"/>
+        </inkml:channelProperties>
+      </inkml:inkSource>
+      <inkml:timestamp xml:id="ts0" timeString="2020-11-19T23:23:42.492"/>
+    </inkml:context>
+    <inkml:brush xml:id="br0">
+      <inkml:brushProperty name="width" value="0.35" units="cm"/>
+      <inkml:brushProperty name="height" value="0.35" units="cm"/>
+      <inkml:brushProperty name="color" value="#FFFFFF"/>
+    </inkml:brush>
+  </inkml:definitions>
+  <inkml:trace contextRef="#ctx0" brushRef="#br0">1 0 24575,'0'0'0</inkml:trace>
 </inkml:ink>
 </file>
 
@@ -1267,7 +2172,7 @@
           <a:p>
             <a:fld id="{D6DC9C9C-EE79-784E-8586-1CA244E33F2D}" type="datetimeFigureOut">
               <a:rPr lang="it-IT" smtClean="0"/>
-              <a:t>19/11/20</a:t>
+              <a:t>20/11/20</a:t>
             </a:fld>
             <a:endParaRPr lang="it-IT"/>
           </a:p>
@@ -1765,7 +2670,7 @@
           <a:p>
             <a:fld id="{24E612C1-E274-2842-A0C2-757BE9233049}" type="datetimeFigureOut">
               <a:rPr lang="it-IT" smtClean="0"/>
-              <a:t>19/11/20</a:t>
+              <a:t>20/11/20</a:t>
             </a:fld>
             <a:endParaRPr lang="it-IT"/>
           </a:p>
@@ -1963,7 +2868,7 @@
           <a:p>
             <a:fld id="{24E612C1-E274-2842-A0C2-757BE9233049}" type="datetimeFigureOut">
               <a:rPr lang="it-IT" smtClean="0"/>
-              <a:t>19/11/20</a:t>
+              <a:t>20/11/20</a:t>
             </a:fld>
             <a:endParaRPr lang="it-IT"/>
           </a:p>
@@ -2171,7 +3076,7 @@
           <a:p>
             <a:fld id="{24E612C1-E274-2842-A0C2-757BE9233049}" type="datetimeFigureOut">
               <a:rPr lang="it-IT" smtClean="0"/>
-              <a:t>19/11/20</a:t>
+              <a:t>20/11/20</a:t>
             </a:fld>
             <a:endParaRPr lang="it-IT"/>
           </a:p>
@@ -2369,7 +3274,7 @@
           <a:p>
             <a:fld id="{24E612C1-E274-2842-A0C2-757BE9233049}" type="datetimeFigureOut">
               <a:rPr lang="it-IT" smtClean="0"/>
-              <a:t>19/11/20</a:t>
+              <a:t>20/11/20</a:t>
             </a:fld>
             <a:endParaRPr lang="it-IT"/>
           </a:p>
@@ -2644,7 +3549,7 @@
           <a:p>
             <a:fld id="{24E612C1-E274-2842-A0C2-757BE9233049}" type="datetimeFigureOut">
               <a:rPr lang="it-IT" smtClean="0"/>
-              <a:t>19/11/20</a:t>
+              <a:t>20/11/20</a:t>
             </a:fld>
             <a:endParaRPr lang="it-IT"/>
           </a:p>
@@ -2909,7 +3814,7 @@
           <a:p>
             <a:fld id="{24E612C1-E274-2842-A0C2-757BE9233049}" type="datetimeFigureOut">
               <a:rPr lang="it-IT" smtClean="0"/>
-              <a:t>19/11/20</a:t>
+              <a:t>20/11/20</a:t>
             </a:fld>
             <a:endParaRPr lang="it-IT"/>
           </a:p>
@@ -3321,7 +4226,7 @@
           <a:p>
             <a:fld id="{24E612C1-E274-2842-A0C2-757BE9233049}" type="datetimeFigureOut">
               <a:rPr lang="it-IT" smtClean="0"/>
-              <a:t>19/11/20</a:t>
+              <a:t>20/11/20</a:t>
             </a:fld>
             <a:endParaRPr lang="it-IT"/>
           </a:p>
@@ -3462,7 +4367,7 @@
           <a:p>
             <a:fld id="{24E612C1-E274-2842-A0C2-757BE9233049}" type="datetimeFigureOut">
               <a:rPr lang="it-IT" smtClean="0"/>
-              <a:t>19/11/20</a:t>
+              <a:t>20/11/20</a:t>
             </a:fld>
             <a:endParaRPr lang="it-IT"/>
           </a:p>
@@ -3575,7 +4480,7 @@
           <a:p>
             <a:fld id="{24E612C1-E274-2842-A0C2-757BE9233049}" type="datetimeFigureOut">
               <a:rPr lang="it-IT" smtClean="0"/>
-              <a:t>19/11/20</a:t>
+              <a:t>20/11/20</a:t>
             </a:fld>
             <a:endParaRPr lang="it-IT"/>
           </a:p>
@@ -3886,7 +4791,7 @@
           <a:p>
             <a:fld id="{24E612C1-E274-2842-A0C2-757BE9233049}" type="datetimeFigureOut">
               <a:rPr lang="it-IT" smtClean="0"/>
-              <a:t>19/11/20</a:t>
+              <a:t>20/11/20</a:t>
             </a:fld>
             <a:endParaRPr lang="it-IT"/>
           </a:p>
@@ -4174,7 +5079,7 @@
           <a:p>
             <a:fld id="{24E612C1-E274-2842-A0C2-757BE9233049}" type="datetimeFigureOut">
               <a:rPr lang="it-IT" smtClean="0"/>
-              <a:t>19/11/20</a:t>
+              <a:t>20/11/20</a:t>
             </a:fld>
             <a:endParaRPr lang="it-IT"/>
           </a:p>
@@ -4415,7 +5320,7 @@
           <a:p>
             <a:fld id="{24E612C1-E274-2842-A0C2-757BE9233049}" type="datetimeFigureOut">
               <a:rPr lang="it-IT" smtClean="0"/>
-              <a:t>19/11/20</a:t>
+              <a:t>20/11/20</a:t>
             </a:fld>
             <a:endParaRPr lang="it-IT"/>
           </a:p>
@@ -6575,6 +7480,1113 @@
     <p:extLst>
       <p:ext uri="{BB962C8B-B14F-4D97-AF65-F5344CB8AC3E}">
         <p14:creationId xmlns:p14="http://schemas.microsoft.com/office/powerpoint/2010/main" val="1259173155"/>
+      </p:ext>
+    </p:extLst>
+  </p:cSld>
+  <p:clrMapOvr>
+    <a:masterClrMapping/>
+  </p:clrMapOvr>
+</p:sld>
+</file>
+
+<file path=ppt/slides/slide10.xml><?xml version="1.0" encoding="utf-8"?>
+<p:sld xmlns:a="http://schemas.openxmlformats.org/drawingml/2006/main" xmlns:r="http://schemas.openxmlformats.org/officeDocument/2006/relationships" xmlns:p="http://schemas.openxmlformats.org/presentationml/2006/main">
+  <p:cSld>
+    <p:spTree>
+      <p:nvGrpSpPr>
+        <p:cNvPr id="1" name=""/>
+        <p:cNvGrpSpPr/>
+        <p:nvPr/>
+      </p:nvGrpSpPr>
+      <p:grpSpPr>
+        <a:xfrm>
+          <a:off x="0" y="0"/>
+          <a:ext cx="0" cy="0"/>
+          <a:chOff x="0" y="0"/>
+          <a:chExt cx="0" cy="0"/>
+        </a:xfrm>
+      </p:grpSpPr>
+      <p:pic>
+        <p:nvPicPr>
+          <p:cNvPr id="3" name="Immagine 2">
+            <a:extLst>
+              <a:ext uri="{FF2B5EF4-FFF2-40B4-BE49-F238E27FC236}">
+                <a16:creationId xmlns:a16="http://schemas.microsoft.com/office/drawing/2014/main" id="{78BF80EB-2702-8149-93C3-7CE363C67C15}"/>
+              </a:ext>
+            </a:extLst>
+          </p:cNvPr>
+          <p:cNvPicPr>
+            <a:picLocks noChangeAspect="1"/>
+          </p:cNvPicPr>
+          <p:nvPr/>
+        </p:nvPicPr>
+        <p:blipFill>
+          <a:blip r:embed="rId2"/>
+          <a:stretch>
+            <a:fillRect/>
+          </a:stretch>
+        </p:blipFill>
+        <p:spPr>
+          <a:xfrm>
+            <a:off x="832644" y="3720659"/>
+            <a:ext cx="3690841" cy="2648609"/>
+          </a:xfrm>
+          <a:prstGeom prst="rect">
+            <a:avLst/>
+          </a:prstGeom>
+        </p:spPr>
+      </p:pic>
+      <p:pic>
+        <p:nvPicPr>
+          <p:cNvPr id="7" name="Immagine 6">
+            <a:extLst>
+              <a:ext uri="{FF2B5EF4-FFF2-40B4-BE49-F238E27FC236}">
+                <a16:creationId xmlns:a16="http://schemas.microsoft.com/office/drawing/2014/main" id="{03A4D1AE-66A4-2D49-B3C2-56725BBBDB3F}"/>
+              </a:ext>
+            </a:extLst>
+          </p:cNvPr>
+          <p:cNvPicPr>
+            <a:picLocks noChangeAspect="1"/>
+          </p:cNvPicPr>
+          <p:nvPr/>
+        </p:nvPicPr>
+        <p:blipFill>
+          <a:blip r:embed="rId3"/>
+          <a:stretch>
+            <a:fillRect/>
+          </a:stretch>
+        </p:blipFill>
+        <p:spPr>
+          <a:xfrm>
+            <a:off x="5938697" y="3053255"/>
+            <a:ext cx="3690841" cy="3843829"/>
+          </a:xfrm>
+          <a:prstGeom prst="rect">
+            <a:avLst/>
+          </a:prstGeom>
+        </p:spPr>
+      </p:pic>
+      <p:pic>
+        <p:nvPicPr>
+          <p:cNvPr id="11" name="Immagine 10">
+            <a:extLst>
+              <a:ext uri="{FF2B5EF4-FFF2-40B4-BE49-F238E27FC236}">
+                <a16:creationId xmlns:a16="http://schemas.microsoft.com/office/drawing/2014/main" id="{4A931C40-CC08-934A-BF0D-9947EAD3276C}"/>
+              </a:ext>
+            </a:extLst>
+          </p:cNvPr>
+          <p:cNvPicPr>
+            <a:picLocks noChangeAspect="1"/>
+          </p:cNvPicPr>
+          <p:nvPr/>
+        </p:nvPicPr>
+        <p:blipFill>
+          <a:blip r:embed="rId4"/>
+          <a:stretch>
+            <a:fillRect/>
+          </a:stretch>
+        </p:blipFill>
+        <p:spPr>
+          <a:xfrm>
+            <a:off x="5938090" y="-21018"/>
+            <a:ext cx="3750475" cy="2701119"/>
+          </a:xfrm>
+          <a:prstGeom prst="rect">
+            <a:avLst/>
+          </a:prstGeom>
+        </p:spPr>
+      </p:pic>
+      <p:pic>
+        <p:nvPicPr>
+          <p:cNvPr id="17" name="Immagine 16">
+            <a:extLst>
+              <a:ext uri="{FF2B5EF4-FFF2-40B4-BE49-F238E27FC236}">
+                <a16:creationId xmlns:a16="http://schemas.microsoft.com/office/drawing/2014/main" id="{4145B6A6-A890-624D-A83E-7AC25B08B116}"/>
+              </a:ext>
+            </a:extLst>
+          </p:cNvPr>
+          <p:cNvPicPr>
+            <a:picLocks noChangeAspect="1"/>
+          </p:cNvPicPr>
+          <p:nvPr/>
+        </p:nvPicPr>
+        <p:blipFill>
+          <a:blip r:embed="rId5"/>
+          <a:stretch>
+            <a:fillRect/>
+          </a:stretch>
+        </p:blipFill>
+        <p:spPr>
+          <a:xfrm>
+            <a:off x="842547" y="-21020"/>
+            <a:ext cx="3750475" cy="2701119"/>
+          </a:xfrm>
+          <a:prstGeom prst="rect">
+            <a:avLst/>
+          </a:prstGeom>
+        </p:spPr>
+      </p:pic>
+    </p:spTree>
+    <p:extLst>
+      <p:ext uri="{BB962C8B-B14F-4D97-AF65-F5344CB8AC3E}">
+        <p14:creationId xmlns:p14="http://schemas.microsoft.com/office/powerpoint/2010/main" val="2869491947"/>
+      </p:ext>
+    </p:extLst>
+  </p:cSld>
+  <p:clrMapOvr>
+    <a:masterClrMapping/>
+  </p:clrMapOvr>
+</p:sld>
+</file>
+
+<file path=ppt/slides/slide11.xml><?xml version="1.0" encoding="utf-8"?>
+<p:sld xmlns:a="http://schemas.openxmlformats.org/drawingml/2006/main" xmlns:r="http://schemas.openxmlformats.org/officeDocument/2006/relationships" xmlns:p="http://schemas.openxmlformats.org/presentationml/2006/main">
+  <p:cSld>
+    <p:spTree>
+      <p:nvGrpSpPr>
+        <p:cNvPr id="1" name=""/>
+        <p:cNvGrpSpPr/>
+        <p:nvPr/>
+      </p:nvGrpSpPr>
+      <p:grpSpPr>
+        <a:xfrm>
+          <a:off x="0" y="0"/>
+          <a:ext cx="0" cy="0"/>
+          <a:chOff x="0" y="0"/>
+          <a:chExt cx="0" cy="0"/>
+        </a:xfrm>
+      </p:grpSpPr>
+      <p:pic>
+        <p:nvPicPr>
+          <p:cNvPr id="3" name="Immagine 2">
+            <a:extLst>
+              <a:ext uri="{FF2B5EF4-FFF2-40B4-BE49-F238E27FC236}">
+                <a16:creationId xmlns:a16="http://schemas.microsoft.com/office/drawing/2014/main" id="{78BF80EB-2702-8149-93C3-7CE363C67C15}"/>
+              </a:ext>
+            </a:extLst>
+          </p:cNvPr>
+          <p:cNvPicPr>
+            <a:picLocks noChangeAspect="1"/>
+          </p:cNvPicPr>
+          <p:nvPr/>
+        </p:nvPicPr>
+        <p:blipFill>
+          <a:blip r:embed="rId2"/>
+          <a:stretch>
+            <a:fillRect/>
+          </a:stretch>
+        </p:blipFill>
+        <p:spPr>
+          <a:xfrm>
+            <a:off x="1232034" y="3489441"/>
+            <a:ext cx="3690841" cy="2648609"/>
+          </a:xfrm>
+          <a:prstGeom prst="rect">
+            <a:avLst/>
+          </a:prstGeom>
+        </p:spPr>
+      </p:pic>
+      <p:pic>
+        <p:nvPicPr>
+          <p:cNvPr id="11" name="Immagine 10">
+            <a:extLst>
+              <a:ext uri="{FF2B5EF4-FFF2-40B4-BE49-F238E27FC236}">
+                <a16:creationId xmlns:a16="http://schemas.microsoft.com/office/drawing/2014/main" id="{4A931C40-CC08-934A-BF0D-9947EAD3276C}"/>
+              </a:ext>
+            </a:extLst>
+          </p:cNvPr>
+          <p:cNvPicPr>
+            <a:picLocks noChangeAspect="1"/>
+          </p:cNvPicPr>
+          <p:nvPr/>
+        </p:nvPicPr>
+        <p:blipFill>
+          <a:blip r:embed="rId3"/>
+          <a:stretch>
+            <a:fillRect/>
+          </a:stretch>
+        </p:blipFill>
+        <p:spPr>
+          <a:xfrm>
+            <a:off x="5738396" y="3520973"/>
+            <a:ext cx="3750475" cy="2701119"/>
+          </a:xfrm>
+          <a:prstGeom prst="rect">
+            <a:avLst/>
+          </a:prstGeom>
+        </p:spPr>
+      </p:pic>
+      <p:pic>
+        <p:nvPicPr>
+          <p:cNvPr id="17" name="Immagine 16">
+            <a:extLst>
+              <a:ext uri="{FF2B5EF4-FFF2-40B4-BE49-F238E27FC236}">
+                <a16:creationId xmlns:a16="http://schemas.microsoft.com/office/drawing/2014/main" id="{4145B6A6-A890-624D-A83E-7AC25B08B116}"/>
+              </a:ext>
+            </a:extLst>
+          </p:cNvPr>
+          <p:cNvPicPr>
+            <a:picLocks noChangeAspect="1"/>
+          </p:cNvPicPr>
+          <p:nvPr/>
+        </p:nvPicPr>
+        <p:blipFill>
+          <a:blip r:embed="rId4"/>
+          <a:stretch>
+            <a:fillRect/>
+          </a:stretch>
+        </p:blipFill>
+        <p:spPr>
+          <a:xfrm>
+            <a:off x="1172400" y="273263"/>
+            <a:ext cx="3750475" cy="2701119"/>
+          </a:xfrm>
+          <a:prstGeom prst="rect">
+            <a:avLst/>
+          </a:prstGeom>
+        </p:spPr>
+      </p:pic>
+      <p:pic>
+        <p:nvPicPr>
+          <p:cNvPr id="6" name="Immagine 5">
+            <a:extLst>
+              <a:ext uri="{FF2B5EF4-FFF2-40B4-BE49-F238E27FC236}">
+                <a16:creationId xmlns:a16="http://schemas.microsoft.com/office/drawing/2014/main" id="{77C5D420-7990-3242-9417-8E501F0D4EF5}"/>
+              </a:ext>
+            </a:extLst>
+          </p:cNvPr>
+          <p:cNvPicPr>
+            <a:picLocks noChangeAspect="1"/>
+          </p:cNvPicPr>
+          <p:nvPr/>
+        </p:nvPicPr>
+        <p:blipFill>
+          <a:blip r:embed="rId5"/>
+          <a:stretch>
+            <a:fillRect/>
+          </a:stretch>
+        </p:blipFill>
+        <p:spPr>
+          <a:xfrm>
+            <a:off x="5769927" y="273264"/>
+            <a:ext cx="3750475" cy="2701119"/>
+          </a:xfrm>
+          <a:prstGeom prst="rect">
+            <a:avLst/>
+          </a:prstGeom>
+        </p:spPr>
+      </p:pic>
+    </p:spTree>
+    <p:extLst>
+      <p:ext uri="{BB962C8B-B14F-4D97-AF65-F5344CB8AC3E}">
+        <p14:creationId xmlns:p14="http://schemas.microsoft.com/office/powerpoint/2010/main" val="169795506"/>
+      </p:ext>
+    </p:extLst>
+  </p:cSld>
+  <p:clrMapOvr>
+    <a:masterClrMapping/>
+  </p:clrMapOvr>
+</p:sld>
+</file>
+
+<file path=ppt/slides/slide12.xml><?xml version="1.0" encoding="utf-8"?>
+<p:sld xmlns:a="http://schemas.openxmlformats.org/drawingml/2006/main" xmlns:r="http://schemas.openxmlformats.org/officeDocument/2006/relationships" xmlns:p="http://schemas.openxmlformats.org/presentationml/2006/main">
+  <p:cSld>
+    <p:spTree>
+      <p:nvGrpSpPr>
+        <p:cNvPr id="1" name=""/>
+        <p:cNvGrpSpPr/>
+        <p:nvPr/>
+      </p:nvGrpSpPr>
+      <p:grpSpPr>
+        <a:xfrm>
+          <a:off x="0" y="0"/>
+          <a:ext cx="0" cy="0"/>
+          <a:chOff x="0" y="0"/>
+          <a:chExt cx="0" cy="0"/>
+        </a:xfrm>
+      </p:grpSpPr>
+      <p:pic>
+        <p:nvPicPr>
+          <p:cNvPr id="3" name="Immagine 2" descr="Immagine che contiene tavolo&#10;&#10;Descrizione generata automaticamente">
+            <a:extLst>
+              <a:ext uri="{FF2B5EF4-FFF2-40B4-BE49-F238E27FC236}">
+                <a16:creationId xmlns:a16="http://schemas.microsoft.com/office/drawing/2014/main" id="{9E7D2C4F-35EA-9147-B93B-1E3EF355CC21}"/>
+              </a:ext>
+            </a:extLst>
+          </p:cNvPr>
+          <p:cNvPicPr>
+            <a:picLocks noChangeAspect="1"/>
+          </p:cNvPicPr>
+          <p:nvPr/>
+        </p:nvPicPr>
+        <p:blipFill rotWithShape="1">
+          <a:blip r:embed="rId2"/>
+          <a:srcRect t="3866" r="39270" b="16480"/>
+          <a:stretch/>
+        </p:blipFill>
+        <p:spPr>
+          <a:xfrm>
+            <a:off x="115614" y="0"/>
+            <a:ext cx="7157545" cy="3352801"/>
+          </a:xfrm>
+          <a:prstGeom prst="rect">
+            <a:avLst/>
+          </a:prstGeom>
+        </p:spPr>
+      </p:pic>
+      <p:pic>
+        <p:nvPicPr>
+          <p:cNvPr id="6" name="Immagine 5" descr="Immagine che contiene tavolo&#10;&#10;Descrizione generata automaticamente">
+            <a:extLst>
+              <a:ext uri="{FF2B5EF4-FFF2-40B4-BE49-F238E27FC236}">
+                <a16:creationId xmlns:a16="http://schemas.microsoft.com/office/drawing/2014/main" id="{42735B48-8493-F945-9EAA-8AF4A46F8EC3}"/>
+              </a:ext>
+            </a:extLst>
+          </p:cNvPr>
+          <p:cNvPicPr>
+            <a:picLocks noChangeAspect="1"/>
+          </p:cNvPicPr>
+          <p:nvPr/>
+        </p:nvPicPr>
+        <p:blipFill rotWithShape="1">
+          <a:blip r:embed="rId2"/>
+          <a:srcRect l="67552"/>
+          <a:stretch/>
+        </p:blipFill>
+        <p:spPr>
+          <a:xfrm>
+            <a:off x="7967217" y="0"/>
+            <a:ext cx="4224783" cy="4650068"/>
+          </a:xfrm>
+          <a:prstGeom prst="rect">
+            <a:avLst/>
+          </a:prstGeom>
+        </p:spPr>
+      </p:pic>
+    </p:spTree>
+    <p:extLst>
+      <p:ext uri="{BB962C8B-B14F-4D97-AF65-F5344CB8AC3E}">
+        <p14:creationId xmlns:p14="http://schemas.microsoft.com/office/powerpoint/2010/main" val="2217737069"/>
+      </p:ext>
+    </p:extLst>
+  </p:cSld>
+  <p:clrMapOvr>
+    <a:masterClrMapping/>
+  </p:clrMapOvr>
+</p:sld>
+</file>
+
+<file path=ppt/slides/slide13.xml><?xml version="1.0" encoding="utf-8"?>
+<p:sld xmlns:a="http://schemas.openxmlformats.org/drawingml/2006/main" xmlns:r="http://schemas.openxmlformats.org/officeDocument/2006/relationships" xmlns:p="http://schemas.openxmlformats.org/presentationml/2006/main">
+  <p:cSld>
+    <p:spTree>
+      <p:nvGrpSpPr>
+        <p:cNvPr id="1" name=""/>
+        <p:cNvGrpSpPr/>
+        <p:nvPr/>
+      </p:nvGrpSpPr>
+      <p:grpSpPr>
+        <a:xfrm>
+          <a:off x="0" y="0"/>
+          <a:ext cx="0" cy="0"/>
+          <a:chOff x="0" y="0"/>
+          <a:chExt cx="0" cy="0"/>
+        </a:xfrm>
+      </p:grpSpPr>
+      <p:pic>
+        <p:nvPicPr>
+          <p:cNvPr id="3" name="Immagine 2">
+            <a:extLst>
+              <a:ext uri="{FF2B5EF4-FFF2-40B4-BE49-F238E27FC236}">
+                <a16:creationId xmlns:a16="http://schemas.microsoft.com/office/drawing/2014/main" id="{F26582A1-4FC0-9A4D-A8B0-A3DAC779A0C1}"/>
+              </a:ext>
+            </a:extLst>
+          </p:cNvPr>
+          <p:cNvPicPr>
+            <a:picLocks noChangeAspect="1"/>
+          </p:cNvPicPr>
+          <p:nvPr/>
+        </p:nvPicPr>
+        <p:blipFill rotWithShape="1">
+          <a:blip r:embed="rId2"/>
+          <a:srcRect t="6415" r="48570" b="13361"/>
+          <a:stretch/>
+        </p:blipFill>
+        <p:spPr>
+          <a:xfrm>
+            <a:off x="0" y="420413"/>
+            <a:ext cx="8218224" cy="2163138"/>
+          </a:xfrm>
+          <a:prstGeom prst="rect">
+            <a:avLst/>
+          </a:prstGeom>
+        </p:spPr>
+      </p:pic>
+      <p:pic>
+        <p:nvPicPr>
+          <p:cNvPr id="6" name="Immagine 5">
+            <a:extLst>
+              <a:ext uri="{FF2B5EF4-FFF2-40B4-BE49-F238E27FC236}">
+                <a16:creationId xmlns:a16="http://schemas.microsoft.com/office/drawing/2014/main" id="{96B1AA77-5700-3345-B114-5B901950E585}"/>
+              </a:ext>
+            </a:extLst>
+          </p:cNvPr>
+          <p:cNvPicPr>
+            <a:picLocks noChangeAspect="1"/>
+          </p:cNvPicPr>
+          <p:nvPr/>
+        </p:nvPicPr>
+        <p:blipFill rotWithShape="1">
+          <a:blip r:embed="rId2"/>
+          <a:srcRect l="52752"/>
+          <a:stretch/>
+        </p:blipFill>
+        <p:spPr>
+          <a:xfrm>
+            <a:off x="8294227" y="0"/>
+            <a:ext cx="9010675" cy="3218074"/>
+          </a:xfrm>
+          <a:prstGeom prst="rect">
+            <a:avLst/>
+          </a:prstGeom>
+        </p:spPr>
+      </p:pic>
+    </p:spTree>
+    <p:extLst>
+      <p:ext uri="{BB962C8B-B14F-4D97-AF65-F5344CB8AC3E}">
+        <p14:creationId xmlns:p14="http://schemas.microsoft.com/office/powerpoint/2010/main" val="3203630581"/>
+      </p:ext>
+    </p:extLst>
+  </p:cSld>
+  <p:clrMapOvr>
+    <a:masterClrMapping/>
+  </p:clrMapOvr>
+</p:sld>
+</file>
+
+<file path=ppt/slides/slide14.xml><?xml version="1.0" encoding="utf-8"?>
+<p:sld xmlns:a="http://schemas.openxmlformats.org/drawingml/2006/main" xmlns:r="http://schemas.openxmlformats.org/officeDocument/2006/relationships" xmlns:p="http://schemas.openxmlformats.org/presentationml/2006/main">
+  <p:cSld>
+    <p:spTree>
+      <p:nvGrpSpPr>
+        <p:cNvPr id="1" name=""/>
+        <p:cNvGrpSpPr/>
+        <p:nvPr/>
+      </p:nvGrpSpPr>
+      <p:grpSpPr>
+        <a:xfrm>
+          <a:off x="0" y="0"/>
+          <a:ext cx="0" cy="0"/>
+          <a:chOff x="0" y="0"/>
+          <a:chExt cx="0" cy="0"/>
+        </a:xfrm>
+      </p:grpSpPr>
+      <p:pic>
+        <p:nvPicPr>
+          <p:cNvPr id="3" name="Immagine 2">
+            <a:extLst>
+              <a:ext uri="{FF2B5EF4-FFF2-40B4-BE49-F238E27FC236}">
+                <a16:creationId xmlns:a16="http://schemas.microsoft.com/office/drawing/2014/main" id="{C8B42D70-985A-5241-A3E1-1AA665BADBB7}"/>
+              </a:ext>
+            </a:extLst>
+          </p:cNvPr>
+          <p:cNvPicPr>
+            <a:picLocks noChangeAspect="1"/>
+          </p:cNvPicPr>
+          <p:nvPr/>
+        </p:nvPicPr>
+        <p:blipFill rotWithShape="1">
+          <a:blip r:embed="rId2"/>
+          <a:srcRect t="11590" r="72563" b="36580"/>
+          <a:stretch/>
+        </p:blipFill>
+        <p:spPr>
+          <a:xfrm>
+            <a:off x="0" y="893379"/>
+            <a:ext cx="3478924" cy="2070538"/>
+          </a:xfrm>
+          <a:prstGeom prst="rect">
+            <a:avLst/>
+          </a:prstGeom>
+        </p:spPr>
+      </p:pic>
+      <p:pic>
+        <p:nvPicPr>
+          <p:cNvPr id="6" name="Immagine 5">
+            <a:extLst>
+              <a:ext uri="{FF2B5EF4-FFF2-40B4-BE49-F238E27FC236}">
+                <a16:creationId xmlns:a16="http://schemas.microsoft.com/office/drawing/2014/main" id="{49F23A19-10EC-0E45-B683-4A1D0B74AC6C}"/>
+              </a:ext>
+            </a:extLst>
+          </p:cNvPr>
+          <p:cNvPicPr>
+            <a:picLocks noChangeAspect="1"/>
+          </p:cNvPicPr>
+          <p:nvPr/>
+        </p:nvPicPr>
+        <p:blipFill rotWithShape="1">
+          <a:blip r:embed="rId2"/>
+          <a:srcRect l="32078"/>
+          <a:stretch/>
+        </p:blipFill>
+        <p:spPr>
+          <a:xfrm>
+            <a:off x="3620518" y="199694"/>
+            <a:ext cx="8791830" cy="4078016"/>
+          </a:xfrm>
+          <a:prstGeom prst="rect">
+            <a:avLst/>
+          </a:prstGeom>
+        </p:spPr>
+      </p:pic>
+    </p:spTree>
+    <p:extLst>
+      <p:ext uri="{BB962C8B-B14F-4D97-AF65-F5344CB8AC3E}">
+        <p14:creationId xmlns:p14="http://schemas.microsoft.com/office/powerpoint/2010/main" val="30725143"/>
+      </p:ext>
+    </p:extLst>
+  </p:cSld>
+  <p:clrMapOvr>
+    <a:masterClrMapping/>
+  </p:clrMapOvr>
+</p:sld>
+</file>
+
+<file path=ppt/slides/slide15.xml><?xml version="1.0" encoding="utf-8"?>
+<p:sld xmlns:a="http://schemas.openxmlformats.org/drawingml/2006/main" xmlns:r="http://schemas.openxmlformats.org/officeDocument/2006/relationships" xmlns:p="http://schemas.openxmlformats.org/presentationml/2006/main">
+  <p:cSld>
+    <p:spTree>
+      <p:nvGrpSpPr>
+        <p:cNvPr id="1" name=""/>
+        <p:cNvGrpSpPr/>
+        <p:nvPr/>
+      </p:nvGrpSpPr>
+      <p:grpSpPr>
+        <a:xfrm>
+          <a:off x="0" y="0"/>
+          <a:ext cx="0" cy="0"/>
+          <a:chOff x="0" y="0"/>
+          <a:chExt cx="0" cy="0"/>
+        </a:xfrm>
+      </p:grpSpPr>
+      <p:pic>
+        <p:nvPicPr>
+          <p:cNvPr id="3" name="Immagine 2" descr="Immagine che contiene tavolo&#10;&#10;Descrizione generata automaticamente">
+            <a:extLst>
+              <a:ext uri="{FF2B5EF4-FFF2-40B4-BE49-F238E27FC236}">
+                <a16:creationId xmlns:a16="http://schemas.microsoft.com/office/drawing/2014/main" id="{8DD5C76B-532B-E54C-8F69-429672F10EED}"/>
+              </a:ext>
+            </a:extLst>
+          </p:cNvPr>
+          <p:cNvPicPr>
+            <a:picLocks noChangeAspect="1"/>
+          </p:cNvPicPr>
+          <p:nvPr/>
+        </p:nvPicPr>
+        <p:blipFill rotWithShape="1">
+          <a:blip r:embed="rId2"/>
+          <a:srcRect l="66356" t="13378"/>
+          <a:stretch/>
+        </p:blipFill>
+        <p:spPr>
+          <a:xfrm>
+            <a:off x="7540669" y="141244"/>
+            <a:ext cx="4722312" cy="3099866"/>
+          </a:xfrm>
+          <a:prstGeom prst="rect">
+            <a:avLst/>
+          </a:prstGeom>
+        </p:spPr>
+      </p:pic>
+      <p:pic>
+        <p:nvPicPr>
+          <p:cNvPr id="6" name="Immagine 5" descr="Immagine che contiene tavolo&#10;&#10;Descrizione generata automaticamente">
+            <a:extLst>
+              <a:ext uri="{FF2B5EF4-FFF2-40B4-BE49-F238E27FC236}">
+                <a16:creationId xmlns:a16="http://schemas.microsoft.com/office/drawing/2014/main" id="{F9481077-B28B-244C-80E6-8EA725AF21DF}"/>
+              </a:ext>
+            </a:extLst>
+          </p:cNvPr>
+          <p:cNvPicPr>
+            <a:picLocks noChangeAspect="1"/>
+          </p:cNvPicPr>
+          <p:nvPr/>
+        </p:nvPicPr>
+        <p:blipFill rotWithShape="1">
+          <a:blip r:embed="rId2"/>
+          <a:srcRect r="37778"/>
+          <a:stretch/>
+        </p:blipFill>
+        <p:spPr>
+          <a:xfrm>
+            <a:off x="-200417" y="339159"/>
+            <a:ext cx="7540669" cy="3089841"/>
+          </a:xfrm>
+          <a:prstGeom prst="rect">
+            <a:avLst/>
+          </a:prstGeom>
+        </p:spPr>
+      </p:pic>
+    </p:spTree>
+    <p:extLst>
+      <p:ext uri="{BB962C8B-B14F-4D97-AF65-F5344CB8AC3E}">
+        <p14:creationId xmlns:p14="http://schemas.microsoft.com/office/powerpoint/2010/main" val="1334726211"/>
+      </p:ext>
+    </p:extLst>
+  </p:cSld>
+  <p:clrMapOvr>
+    <a:masterClrMapping/>
+  </p:clrMapOvr>
+</p:sld>
+</file>
+
+<file path=ppt/slides/slide16.xml><?xml version="1.0" encoding="utf-8"?>
+<p:sld xmlns:a="http://schemas.openxmlformats.org/drawingml/2006/main" xmlns:r="http://schemas.openxmlformats.org/officeDocument/2006/relationships" xmlns:p="http://schemas.openxmlformats.org/presentationml/2006/main">
+  <p:cSld>
+    <p:spTree>
+      <p:nvGrpSpPr>
+        <p:cNvPr id="1" name=""/>
+        <p:cNvGrpSpPr/>
+        <p:nvPr/>
+      </p:nvGrpSpPr>
+      <p:grpSpPr>
+        <a:xfrm>
+          <a:off x="0" y="0"/>
+          <a:ext cx="0" cy="0"/>
+          <a:chOff x="0" y="0"/>
+          <a:chExt cx="0" cy="0"/>
+        </a:xfrm>
+      </p:grpSpPr>
+      <p:graphicFrame>
+        <p:nvGraphicFramePr>
+          <p:cNvPr id="2" name="Tabella 4">
+            <a:extLst>
+              <a:ext uri="{FF2B5EF4-FFF2-40B4-BE49-F238E27FC236}">
+                <a16:creationId xmlns:a16="http://schemas.microsoft.com/office/drawing/2014/main" id="{467042A2-4219-FF4E-BCF2-08B570D94678}"/>
+              </a:ext>
+            </a:extLst>
+          </p:cNvPr>
+          <p:cNvGraphicFramePr>
+            <a:graphicFrameLocks noGrp="1"/>
+          </p:cNvGraphicFramePr>
+          <p:nvPr>
+            <p:extLst>
+              <p:ext uri="{D42A27DB-BD31-4B8C-83A1-F6EECF244321}">
+                <p14:modId xmlns:p14="http://schemas.microsoft.com/office/powerpoint/2010/main" val="435155947"/>
+              </p:ext>
+            </p:extLst>
+          </p:nvPr>
+        </p:nvGraphicFramePr>
+        <p:xfrm>
+          <a:off x="998483" y="704193"/>
+          <a:ext cx="7791012" cy="1979196"/>
+        </p:xfrm>
+        <a:graphic>
+          <a:graphicData uri="http://schemas.openxmlformats.org/drawingml/2006/table">
+            <a:tbl>
+              <a:tblPr firstRow="1" bandRow="1">
+                <a:tableStyleId>{8799B23B-EC83-4686-B30A-512413B5E67A}</a:tableStyleId>
+              </a:tblPr>
+              <a:tblGrid>
+                <a:gridCol w="1609500">
+                  <a:extLst>
+                    <a:ext uri="{9D8B030D-6E8A-4147-A177-3AD203B41FA5}">
+                      <a16:colId xmlns:a16="http://schemas.microsoft.com/office/drawing/2014/main" val="958130683"/>
+                    </a:ext>
+                  </a:extLst>
+                </a:gridCol>
+                <a:gridCol w="1609500">
+                  <a:extLst>
+                    <a:ext uri="{9D8B030D-6E8A-4147-A177-3AD203B41FA5}">
+                      <a16:colId xmlns:a16="http://schemas.microsoft.com/office/drawing/2014/main" val="343763678"/>
+                    </a:ext>
+                  </a:extLst>
+                </a:gridCol>
+                <a:gridCol w="1398904">
+                  <a:extLst>
+                    <a:ext uri="{9D8B030D-6E8A-4147-A177-3AD203B41FA5}">
+                      <a16:colId xmlns:a16="http://schemas.microsoft.com/office/drawing/2014/main" val="3982942333"/>
+                    </a:ext>
+                  </a:extLst>
+                </a:gridCol>
+                <a:gridCol w="1542745">
+                  <a:extLst>
+                    <a:ext uri="{9D8B030D-6E8A-4147-A177-3AD203B41FA5}">
+                      <a16:colId xmlns:a16="http://schemas.microsoft.com/office/drawing/2014/main" val="3241222019"/>
+                    </a:ext>
+                  </a:extLst>
+                </a:gridCol>
+                <a:gridCol w="1630363">
+                  <a:extLst>
+                    <a:ext uri="{9D8B030D-6E8A-4147-A177-3AD203B41FA5}">
+                      <a16:colId xmlns:a16="http://schemas.microsoft.com/office/drawing/2014/main" val="356016346"/>
+                    </a:ext>
+                  </a:extLst>
+                </a:gridCol>
+              </a:tblGrid>
+              <a:tr h="446372">
+                <a:tc>
+                  <a:txBody>
+                    <a:bodyPr/>
+                    <a:lstStyle/>
+                    <a:p>
+                      <a:pPr algn="ctr"/>
+                      <a:r>
+                        <a:rPr lang="it-IT" dirty="0"/>
+                        <a:t>Clustering </a:t>
+                      </a:r>
+                      <a:r>
+                        <a:rPr lang="it-IT" dirty="0" err="1"/>
+                        <a:t>Technique</a:t>
+                      </a:r>
+                      <a:r>
+                        <a:rPr lang="it-IT" dirty="0"/>
+                        <a:t> </a:t>
+                      </a:r>
+                    </a:p>
+                  </a:txBody>
+                  <a:tcPr/>
+                </a:tc>
+                <a:tc>
+                  <a:txBody>
+                    <a:bodyPr/>
+                    <a:lstStyle/>
+                    <a:p>
+                      <a:pPr algn="ctr"/>
+                      <a:r>
+                        <a:rPr lang="it-IT" dirty="0"/>
+                        <a:t>Clustering </a:t>
+                      </a:r>
+                      <a:r>
+                        <a:rPr lang="it-IT" dirty="0" err="1"/>
+                        <a:t>Quality</a:t>
+                      </a:r>
+                      <a:endParaRPr lang="it-IT" dirty="0"/>
+                    </a:p>
+                  </a:txBody>
+                  <a:tcPr/>
+                </a:tc>
+                <a:tc>
+                  <a:txBody>
+                    <a:bodyPr/>
+                    <a:lstStyle/>
+                    <a:p>
+                      <a:pPr algn="ctr"/>
+                      <a:r>
+                        <a:rPr lang="it-IT" dirty="0"/>
+                        <a:t>Silhouette</a:t>
+                      </a:r>
+                    </a:p>
+                    <a:p>
+                      <a:pPr algn="ctr"/>
+                      <a:r>
+                        <a:rPr lang="it-IT" dirty="0"/>
+                        <a:t>Value</a:t>
+                      </a:r>
+                    </a:p>
+                  </a:txBody>
+                  <a:tcPr/>
+                </a:tc>
+                <a:tc>
+                  <a:txBody>
+                    <a:bodyPr/>
+                    <a:lstStyle/>
+                    <a:p>
+                      <a:pPr algn="ctr"/>
+                      <a:r>
+                        <a:rPr lang="it-IT" dirty="0" err="1"/>
+                        <a:t>Number</a:t>
+                      </a:r>
+                      <a:r>
+                        <a:rPr lang="it-IT" dirty="0"/>
+                        <a:t> of cluster</a:t>
+                      </a:r>
+                    </a:p>
+                  </a:txBody>
+                  <a:tcPr/>
+                </a:tc>
+                <a:tc>
+                  <a:txBody>
+                    <a:bodyPr/>
+                    <a:lstStyle/>
+                    <a:p>
+                      <a:pPr algn="ctr"/>
+                      <a:r>
+                        <a:rPr lang="it-IT" dirty="0" err="1"/>
+                        <a:t>Distance</a:t>
+                      </a:r>
+                      <a:r>
+                        <a:rPr lang="it-IT" dirty="0"/>
+                        <a:t> </a:t>
+                      </a:r>
+                      <a:r>
+                        <a:rPr lang="it-IT" dirty="0" err="1"/>
+                        <a:t>metric</a:t>
+                      </a:r>
+                      <a:endParaRPr lang="it-IT" dirty="0"/>
+                    </a:p>
+                  </a:txBody>
+                  <a:tcPr/>
+                </a:tc>
+                <a:extLst>
+                  <a:ext uri="{0D108BD9-81ED-4DB2-BD59-A6C34878D82A}">
+                    <a16:rowId xmlns:a16="http://schemas.microsoft.com/office/drawing/2014/main" val="3211650326"/>
+                  </a:ext>
+                </a:extLst>
+              </a:tr>
+              <a:tr h="446372">
+                <a:tc>
+                  <a:txBody>
+                    <a:bodyPr/>
+                    <a:lstStyle/>
+                    <a:p>
+                      <a:pPr algn="ctr"/>
+                      <a:r>
+                        <a:rPr lang="it-IT" dirty="0"/>
+                        <a:t>K-</a:t>
+                      </a:r>
+                      <a:r>
+                        <a:rPr lang="it-IT" dirty="0" err="1"/>
+                        <a:t>Means</a:t>
+                      </a:r>
+                      <a:endParaRPr lang="it-IT" dirty="0"/>
+                    </a:p>
+                  </a:txBody>
+                  <a:tcPr/>
+                </a:tc>
+                <a:tc>
+                  <a:txBody>
+                    <a:bodyPr/>
+                    <a:lstStyle/>
+                    <a:p>
+                      <a:pPr algn="ctr"/>
+                      <a:r>
+                        <a:rPr lang="it-IT" dirty="0" err="1"/>
+                        <a:t>Excellent</a:t>
+                      </a:r>
+                      <a:endParaRPr lang="it-IT" dirty="0"/>
+                    </a:p>
+                  </a:txBody>
+                  <a:tcPr/>
+                </a:tc>
+                <a:tc>
+                  <a:txBody>
+                    <a:bodyPr/>
+                    <a:lstStyle/>
+                    <a:p>
+                      <a:pPr algn="ctr"/>
+                      <a:r>
+                        <a:rPr lang="it-IT" dirty="0"/>
+                        <a:t>0.6489</a:t>
+                      </a:r>
+                    </a:p>
+                  </a:txBody>
+                  <a:tcPr/>
+                </a:tc>
+                <a:tc>
+                  <a:txBody>
+                    <a:bodyPr/>
+                    <a:lstStyle/>
+                    <a:p>
+                      <a:pPr algn="ctr"/>
+                      <a:r>
+                        <a:rPr lang="it-IT" dirty="0"/>
+                        <a:t>6</a:t>
+                      </a:r>
+                    </a:p>
+                  </a:txBody>
+                  <a:tcPr/>
+                </a:tc>
+                <a:tc>
+                  <a:txBody>
+                    <a:bodyPr/>
+                    <a:lstStyle/>
+                    <a:p>
+                      <a:pPr algn="ctr"/>
+                      <a:r>
+                        <a:rPr lang="it-IT" dirty="0" err="1"/>
+                        <a:t>euclidean</a:t>
+                      </a:r>
+                      <a:endParaRPr lang="it-IT" dirty="0"/>
+                    </a:p>
+                  </a:txBody>
+                  <a:tcPr/>
+                </a:tc>
+                <a:extLst>
+                  <a:ext uri="{0D108BD9-81ED-4DB2-BD59-A6C34878D82A}">
+                    <a16:rowId xmlns:a16="http://schemas.microsoft.com/office/drawing/2014/main" val="3294786535"/>
+                  </a:ext>
+                </a:extLst>
+              </a:tr>
+              <a:tr h="446372">
+                <a:tc>
+                  <a:txBody>
+                    <a:bodyPr/>
+                    <a:lstStyle/>
+                    <a:p>
+                      <a:pPr algn="ctr"/>
+                      <a:r>
+                        <a:rPr lang="it-IT" dirty="0" err="1"/>
+                        <a:t>DBScan</a:t>
+                      </a:r>
+                      <a:endParaRPr lang="it-IT" dirty="0"/>
+                    </a:p>
+                  </a:txBody>
+                  <a:tcPr/>
+                </a:tc>
+                <a:tc>
+                  <a:txBody>
+                    <a:bodyPr/>
+                    <a:lstStyle/>
+                    <a:p>
+                      <a:pPr algn="ctr"/>
+                      <a:r>
+                        <a:rPr lang="it-IT" dirty="0" err="1"/>
+                        <a:t>Poor</a:t>
+                      </a:r>
+                      <a:endParaRPr lang="it-IT" dirty="0"/>
+                    </a:p>
+                  </a:txBody>
+                  <a:tcPr/>
+                </a:tc>
+                <a:tc>
+                  <a:txBody>
+                    <a:bodyPr/>
+                    <a:lstStyle/>
+                    <a:p>
+                      <a:pPr algn="ctr"/>
+                      <a:r>
+                        <a:rPr lang="it-IT" dirty="0"/>
+                        <a:t>0.5859</a:t>
+                      </a:r>
+                    </a:p>
+                  </a:txBody>
+                  <a:tcPr/>
+                </a:tc>
+                <a:tc>
+                  <a:txBody>
+                    <a:bodyPr/>
+                    <a:lstStyle/>
+                    <a:p>
+                      <a:pPr algn="ctr"/>
+                      <a:r>
+                        <a:rPr lang="it-IT" dirty="0"/>
+                        <a:t>1</a:t>
+                      </a:r>
+                    </a:p>
+                  </a:txBody>
+                  <a:tcPr/>
+                </a:tc>
+                <a:tc>
+                  <a:txBody>
+                    <a:bodyPr/>
+                    <a:lstStyle/>
+                    <a:p>
+                      <a:pPr algn="ctr"/>
+                      <a:r>
+                        <a:rPr lang="it-IT" dirty="0" err="1"/>
+                        <a:t>euclidean</a:t>
+                      </a:r>
+                      <a:endParaRPr lang="it-IT" dirty="0"/>
+                    </a:p>
+                  </a:txBody>
+                  <a:tcPr/>
+                </a:tc>
+                <a:extLst>
+                  <a:ext uri="{0D108BD9-81ED-4DB2-BD59-A6C34878D82A}">
+                    <a16:rowId xmlns:a16="http://schemas.microsoft.com/office/drawing/2014/main" val="3255642635"/>
+                  </a:ext>
+                </a:extLst>
+              </a:tr>
+              <a:tr h="446372">
+                <a:tc>
+                  <a:txBody>
+                    <a:bodyPr/>
+                    <a:lstStyle/>
+                    <a:p>
+                      <a:pPr algn="ctr"/>
+                      <a:r>
+                        <a:rPr lang="it-IT" dirty="0" err="1"/>
+                        <a:t>Hierarchical</a:t>
+                      </a:r>
+                      <a:endParaRPr lang="it-IT" dirty="0"/>
+                    </a:p>
+                  </a:txBody>
+                  <a:tcPr/>
+                </a:tc>
+                <a:tc>
+                  <a:txBody>
+                    <a:bodyPr/>
+                    <a:lstStyle/>
+                    <a:p>
+                      <a:pPr algn="ctr"/>
+                      <a:r>
+                        <a:rPr lang="it-IT" dirty="0" err="1"/>
+                        <a:t>Good</a:t>
+                      </a:r>
+                      <a:endParaRPr lang="it-IT" dirty="0"/>
+                    </a:p>
+                  </a:txBody>
+                  <a:tcPr/>
+                </a:tc>
+                <a:tc>
+                  <a:txBody>
+                    <a:bodyPr/>
+                    <a:lstStyle/>
+                    <a:p>
+                      <a:pPr algn="ctr"/>
+                      <a:r>
+                        <a:rPr lang="it-IT" dirty="0"/>
+                        <a:t>0.5094</a:t>
+                      </a:r>
+                    </a:p>
+                  </a:txBody>
+                  <a:tcPr/>
+                </a:tc>
+                <a:tc>
+                  <a:txBody>
+                    <a:bodyPr/>
+                    <a:lstStyle/>
+                    <a:p>
+                      <a:pPr algn="ctr"/>
+                      <a:r>
+                        <a:rPr lang="it-IT" dirty="0"/>
+                        <a:t>3</a:t>
+                      </a:r>
+                    </a:p>
+                  </a:txBody>
+                  <a:tcPr/>
+                </a:tc>
+                <a:tc>
+                  <a:txBody>
+                    <a:bodyPr/>
+                    <a:lstStyle/>
+                    <a:p>
+                      <a:pPr algn="ctr"/>
+                      <a:r>
+                        <a:rPr lang="it-IT" dirty="0" err="1"/>
+                        <a:t>euclidean</a:t>
+                      </a:r>
+                      <a:endParaRPr lang="it-IT" dirty="0"/>
+                    </a:p>
+                  </a:txBody>
+                  <a:tcPr/>
+                </a:tc>
+                <a:extLst>
+                  <a:ext uri="{0D108BD9-81ED-4DB2-BD59-A6C34878D82A}">
+                    <a16:rowId xmlns:a16="http://schemas.microsoft.com/office/drawing/2014/main" val="530914676"/>
+                  </a:ext>
+                </a:extLst>
+              </a:tr>
+            </a:tbl>
+          </a:graphicData>
+        </a:graphic>
+      </p:graphicFrame>
+    </p:spTree>
+    <p:extLst>
+      <p:ext uri="{BB962C8B-B14F-4D97-AF65-F5344CB8AC3E}">
+        <p14:creationId xmlns:p14="http://schemas.microsoft.com/office/powerpoint/2010/main" val="1121773155"/>
       </p:ext>
     </p:extLst>
   </p:cSld>
@@ -13865,10 +15877,186 @@
       </p:grpSpPr>
       <p:pic>
         <p:nvPicPr>
+          <p:cNvPr id="4" name="Immagine 3">
+            <a:extLst>
+              <a:ext uri="{FF2B5EF4-FFF2-40B4-BE49-F238E27FC236}">
+                <a16:creationId xmlns:a16="http://schemas.microsoft.com/office/drawing/2014/main" id="{6F18BB7E-2233-1945-8E4B-383FA0072C5C}"/>
+              </a:ext>
+            </a:extLst>
+          </p:cNvPr>
+          <p:cNvPicPr>
+            <a:picLocks noChangeAspect="1"/>
+          </p:cNvPicPr>
+          <p:nvPr/>
+        </p:nvPicPr>
+        <p:blipFill rotWithShape="1">
+          <a:blip r:embed="rId2"/>
+          <a:srcRect r="85510" b="9622"/>
+          <a:stretch/>
+        </p:blipFill>
+        <p:spPr>
+          <a:xfrm>
+            <a:off x="0" y="0"/>
+            <a:ext cx="1866378" cy="3089841"/>
+          </a:xfrm>
+          <a:prstGeom prst="rect">
+            <a:avLst/>
+          </a:prstGeom>
+        </p:spPr>
+      </p:pic>
+      <p:pic>
+        <p:nvPicPr>
+          <p:cNvPr id="5" name="Immagine 4">
+            <a:extLst>
+              <a:ext uri="{FF2B5EF4-FFF2-40B4-BE49-F238E27FC236}">
+                <a16:creationId xmlns:a16="http://schemas.microsoft.com/office/drawing/2014/main" id="{97D841E2-D9D7-6F45-9F4E-53735F4717A5}"/>
+              </a:ext>
+            </a:extLst>
+          </p:cNvPr>
+          <p:cNvPicPr>
+            <a:picLocks noChangeAspect="1"/>
+          </p:cNvPicPr>
+          <p:nvPr/>
+        </p:nvPicPr>
+        <p:blipFill rotWithShape="1">
+          <a:blip r:embed="rId2"/>
+          <a:srcRect l="19434" b="377"/>
+          <a:stretch/>
+        </p:blipFill>
+        <p:spPr>
+          <a:xfrm>
+            <a:off x="1605922" y="438440"/>
+            <a:ext cx="9386170" cy="3080854"/>
+          </a:xfrm>
+          <a:prstGeom prst="rect">
+            <a:avLst/>
+          </a:prstGeom>
+        </p:spPr>
+      </p:pic>
+    </p:spTree>
+    <p:extLst>
+      <p:ext uri="{BB962C8B-B14F-4D97-AF65-F5344CB8AC3E}">
+        <p14:creationId xmlns:p14="http://schemas.microsoft.com/office/powerpoint/2010/main" val="4284197351"/>
+      </p:ext>
+    </p:extLst>
+  </p:cSld>
+  <p:clrMapOvr>
+    <a:masterClrMapping/>
+  </p:clrMapOvr>
+</p:sld>
+</file>
+
+<file path=ppt/slides/slide8.xml><?xml version="1.0" encoding="utf-8"?>
+<p:sld xmlns:a="http://schemas.openxmlformats.org/drawingml/2006/main" xmlns:r="http://schemas.openxmlformats.org/officeDocument/2006/relationships" xmlns:p="http://schemas.openxmlformats.org/presentationml/2006/main">
+  <p:cSld>
+    <p:spTree>
+      <p:nvGrpSpPr>
+        <p:cNvPr id="1" name=""/>
+        <p:cNvGrpSpPr/>
+        <p:nvPr/>
+      </p:nvGrpSpPr>
+      <p:grpSpPr>
+        <a:xfrm>
+          <a:off x="0" y="0"/>
+          <a:ext cx="0" cy="0"/>
+          <a:chOff x="0" y="0"/>
+          <a:chExt cx="0" cy="0"/>
+        </a:xfrm>
+      </p:grpSpPr>
+      <p:pic>
+        <p:nvPicPr>
           <p:cNvPr id="3" name="Immagine 2">
             <a:extLst>
               <a:ext uri="{FF2B5EF4-FFF2-40B4-BE49-F238E27FC236}">
-                <a16:creationId xmlns:a16="http://schemas.microsoft.com/office/drawing/2014/main" id="{EACCB206-CEDB-614D-BF9C-1191EBDB08FB}"/>
+                <a16:creationId xmlns:a16="http://schemas.microsoft.com/office/drawing/2014/main" id="{97265A5B-4603-3E4B-A707-4C4BE2424FC6}"/>
+              </a:ext>
+            </a:extLst>
+          </p:cNvPr>
+          <p:cNvPicPr>
+            <a:picLocks noChangeAspect="1"/>
+          </p:cNvPicPr>
+          <p:nvPr/>
+        </p:nvPicPr>
+        <p:blipFill rotWithShape="1">
+          <a:blip r:embed="rId2"/>
+          <a:srcRect l="29601" t="10977" b="7471"/>
+          <a:stretch/>
+        </p:blipFill>
+        <p:spPr>
+          <a:xfrm>
+            <a:off x="3025492" y="286212"/>
+            <a:ext cx="9166508" cy="2698732"/>
+          </a:xfrm>
+          <a:prstGeom prst="rect">
+            <a:avLst/>
+          </a:prstGeom>
+        </p:spPr>
+      </p:pic>
+      <p:pic>
+        <p:nvPicPr>
+          <p:cNvPr id="6" name="Immagine 5">
+            <a:extLst>
+              <a:ext uri="{FF2B5EF4-FFF2-40B4-BE49-F238E27FC236}">
+                <a16:creationId xmlns:a16="http://schemas.microsoft.com/office/drawing/2014/main" id="{FEA5F4FB-E5D8-254B-A1B3-8A02FB988C56}"/>
+              </a:ext>
+            </a:extLst>
+          </p:cNvPr>
+          <p:cNvPicPr>
+            <a:picLocks noChangeAspect="1"/>
+          </p:cNvPicPr>
+          <p:nvPr/>
+        </p:nvPicPr>
+        <p:blipFill rotWithShape="1">
+          <a:blip r:embed="rId2"/>
+          <a:srcRect r="76540"/>
+          <a:stretch/>
+        </p:blipFill>
+        <p:spPr>
+          <a:xfrm>
+            <a:off x="17073" y="0"/>
+            <a:ext cx="2852251" cy="3089841"/>
+          </a:xfrm>
+          <a:prstGeom prst="rect">
+            <a:avLst/>
+          </a:prstGeom>
+        </p:spPr>
+      </p:pic>
+    </p:spTree>
+    <p:extLst>
+      <p:ext uri="{BB962C8B-B14F-4D97-AF65-F5344CB8AC3E}">
+        <p14:creationId xmlns:p14="http://schemas.microsoft.com/office/powerpoint/2010/main" val="2519367403"/>
+      </p:ext>
+    </p:extLst>
+  </p:cSld>
+  <p:clrMapOvr>
+    <a:masterClrMapping/>
+  </p:clrMapOvr>
+</p:sld>
+</file>
+
+<file path=ppt/slides/slide9.xml><?xml version="1.0" encoding="utf-8"?>
+<p:sld xmlns:a="http://schemas.openxmlformats.org/drawingml/2006/main" xmlns:r="http://schemas.openxmlformats.org/officeDocument/2006/relationships" xmlns:p="http://schemas.openxmlformats.org/presentationml/2006/main">
+  <p:cSld>
+    <p:spTree>
+      <p:nvGrpSpPr>
+        <p:cNvPr id="1" name=""/>
+        <p:cNvGrpSpPr/>
+        <p:nvPr/>
+      </p:nvGrpSpPr>
+      <p:grpSpPr>
+        <a:xfrm>
+          <a:off x="0" y="0"/>
+          <a:ext cx="0" cy="0"/>
+          <a:chOff x="0" y="0"/>
+          <a:chExt cx="0" cy="0"/>
+        </a:xfrm>
+      </p:grpSpPr>
+      <p:pic>
+        <p:nvPicPr>
+          <p:cNvPr id="3" name="Immagine 2">
+            <a:extLst>
+              <a:ext uri="{FF2B5EF4-FFF2-40B4-BE49-F238E27FC236}">
+                <a16:creationId xmlns:a16="http://schemas.microsoft.com/office/drawing/2014/main" id="{DD0C2EAD-D689-8D46-B7EC-B6FFE6967DC9}"/>
               </a:ext>
             </a:extLst>
           </p:cNvPr>
@@ -13885,18 +16073,1797 @@
         </p:blipFill>
         <p:spPr>
           <a:xfrm>
-            <a:off x="1263650" y="2146300"/>
-            <a:ext cx="9664700" cy="2565400"/>
+            <a:off x="3472299" y="1978868"/>
+            <a:ext cx="10977217" cy="2579262"/>
           </a:xfrm>
           <a:prstGeom prst="rect">
             <a:avLst/>
           </a:prstGeom>
         </p:spPr>
       </p:pic>
+      <mc:AlternateContent xmlns:mc="http://schemas.openxmlformats.org/markup-compatibility/2006" xmlns:p14="http://schemas.microsoft.com/office/powerpoint/2010/main">
+        <mc:Choice Requires="p14">
+          <p:contentPart p14:bwMode="auto" r:id="rId3">
+            <p14:nvContentPartPr>
+              <p14:cNvPr id="6" name="Input penna 5">
+                <a:extLst>
+                  <a:ext uri="{FF2B5EF4-FFF2-40B4-BE49-F238E27FC236}">
+                    <a16:creationId xmlns:a16="http://schemas.microsoft.com/office/drawing/2014/main" id="{13FE5ED3-14CE-A34D-A791-59526C0FE830}"/>
+                  </a:ext>
+                </a:extLst>
+              </p14:cNvPr>
+              <p14:cNvContentPartPr/>
+              <p14:nvPr/>
+            </p14:nvContentPartPr>
+            <p14:xfrm>
+              <a:off x="3517659" y="4258692"/>
+              <a:ext cx="150120" cy="247320"/>
+            </p14:xfrm>
+          </p:contentPart>
+        </mc:Choice>
+        <mc:Fallback xmlns="">
+          <p:pic>
+            <p:nvPicPr>
+              <p:cNvPr id="6" name="Input penna 5">
+                <a:extLst>
+                  <a:ext uri="{FF2B5EF4-FFF2-40B4-BE49-F238E27FC236}">
+                    <a16:creationId xmlns:a16="http://schemas.microsoft.com/office/drawing/2014/main" id="{13FE5ED3-14CE-A34D-A791-59526C0FE830}"/>
+                  </a:ext>
+                </a:extLst>
+              </p:cNvPr>
+              <p:cNvPicPr/>
+              <p:nvPr/>
+            </p:nvPicPr>
+            <p:blipFill>
+              <a:blip r:embed="rId4"/>
+              <a:stretch>
+                <a:fillRect/>
+              </a:stretch>
+            </p:blipFill>
+            <p:spPr>
+              <a:xfrm>
+                <a:off x="3455019" y="4196052"/>
+                <a:ext cx="275760" cy="372960"/>
+              </a:xfrm>
+              <a:prstGeom prst="rect">
+                <a:avLst/>
+              </a:prstGeom>
+            </p:spPr>
+          </p:pic>
+        </mc:Fallback>
+      </mc:AlternateContent>
+      <mc:AlternateContent xmlns:mc="http://schemas.openxmlformats.org/markup-compatibility/2006" xmlns:p14="http://schemas.microsoft.com/office/powerpoint/2010/main">
+        <mc:Choice Requires="p14">
+          <p:contentPart p14:bwMode="auto" r:id="rId5">
+            <p14:nvContentPartPr>
+              <p14:cNvPr id="7" name="Input penna 6">
+                <a:extLst>
+                  <a:ext uri="{FF2B5EF4-FFF2-40B4-BE49-F238E27FC236}">
+                    <a16:creationId xmlns:a16="http://schemas.microsoft.com/office/drawing/2014/main" id="{C7D75B4C-52B2-D345-8FDC-09ED62F986D1}"/>
+                  </a:ext>
+                </a:extLst>
+              </p14:cNvPr>
+              <p14:cNvContentPartPr/>
+              <p14:nvPr/>
+            </p14:nvContentPartPr>
+            <p14:xfrm>
+              <a:off x="7244019" y="4410612"/>
+              <a:ext cx="314640" cy="45720"/>
+            </p14:xfrm>
+          </p:contentPart>
+        </mc:Choice>
+        <mc:Fallback xmlns="">
+          <p:pic>
+            <p:nvPicPr>
+              <p:cNvPr id="7" name="Input penna 6">
+                <a:extLst>
+                  <a:ext uri="{FF2B5EF4-FFF2-40B4-BE49-F238E27FC236}">
+                    <a16:creationId xmlns:a16="http://schemas.microsoft.com/office/drawing/2014/main" id="{C7D75B4C-52B2-D345-8FDC-09ED62F986D1}"/>
+                  </a:ext>
+                </a:extLst>
+              </p:cNvPr>
+              <p:cNvPicPr/>
+              <p:nvPr/>
+            </p:nvPicPr>
+            <p:blipFill>
+              <a:blip r:embed="rId6"/>
+              <a:stretch>
+                <a:fillRect/>
+              </a:stretch>
+            </p:blipFill>
+            <p:spPr>
+              <a:xfrm>
+                <a:off x="7181379" y="4347972"/>
+                <a:ext cx="440280" cy="171360"/>
+              </a:xfrm>
+              <a:prstGeom prst="rect">
+                <a:avLst/>
+              </a:prstGeom>
+            </p:spPr>
+          </p:pic>
+        </mc:Fallback>
+      </mc:AlternateContent>
+      <mc:AlternateContent xmlns:mc="http://schemas.openxmlformats.org/markup-compatibility/2006" xmlns:p14="http://schemas.microsoft.com/office/powerpoint/2010/main">
+        <mc:Choice Requires="p14">
+          <p:contentPart p14:bwMode="auto" r:id="rId7">
+            <p14:nvContentPartPr>
+              <p14:cNvPr id="8" name="Input penna 7">
+                <a:extLst>
+                  <a:ext uri="{FF2B5EF4-FFF2-40B4-BE49-F238E27FC236}">
+                    <a16:creationId xmlns:a16="http://schemas.microsoft.com/office/drawing/2014/main" id="{86AB8C3B-4003-C844-B65F-10D3758989BB}"/>
+                  </a:ext>
+                </a:extLst>
+              </p14:cNvPr>
+              <p14:cNvContentPartPr/>
+              <p14:nvPr/>
+            </p14:nvContentPartPr>
+            <p14:xfrm>
+              <a:off x="7688619" y="4461012"/>
+              <a:ext cx="360" cy="360"/>
+            </p14:xfrm>
+          </p:contentPart>
+        </mc:Choice>
+        <mc:Fallback xmlns="">
+          <p:pic>
+            <p:nvPicPr>
+              <p:cNvPr id="8" name="Input penna 7">
+                <a:extLst>
+                  <a:ext uri="{FF2B5EF4-FFF2-40B4-BE49-F238E27FC236}">
+                    <a16:creationId xmlns:a16="http://schemas.microsoft.com/office/drawing/2014/main" id="{86AB8C3B-4003-C844-B65F-10D3758989BB}"/>
+                  </a:ext>
+                </a:extLst>
+              </p:cNvPr>
+              <p:cNvPicPr/>
+              <p:nvPr/>
+            </p:nvPicPr>
+            <p:blipFill>
+              <a:blip r:embed="rId8"/>
+              <a:stretch>
+                <a:fillRect/>
+              </a:stretch>
+            </p:blipFill>
+            <p:spPr>
+              <a:xfrm>
+                <a:off x="7625619" y="4398012"/>
+                <a:ext cx="126000" cy="126000"/>
+              </a:xfrm>
+              <a:prstGeom prst="rect">
+                <a:avLst/>
+              </a:prstGeom>
+            </p:spPr>
+          </p:pic>
+        </mc:Fallback>
+      </mc:AlternateContent>
+      <p:grpSp>
+        <p:nvGrpSpPr>
+          <p:cNvPr id="11" name="Gruppo 10">
+            <a:extLst>
+              <a:ext uri="{FF2B5EF4-FFF2-40B4-BE49-F238E27FC236}">
+                <a16:creationId xmlns:a16="http://schemas.microsoft.com/office/drawing/2014/main" id="{DCF8F4E7-309A-8D42-A203-10C453ECC628}"/>
+              </a:ext>
+            </a:extLst>
+          </p:cNvPr>
+          <p:cNvGrpSpPr/>
+          <p:nvPr/>
+        </p:nvGrpSpPr>
+        <p:grpSpPr>
+          <a:xfrm>
+            <a:off x="7850619" y="4427532"/>
+            <a:ext cx="41400" cy="3240"/>
+            <a:chOff x="7850619" y="4427532"/>
+            <a:chExt cx="41400" cy="3240"/>
+          </a:xfrm>
+        </p:grpSpPr>
+        <mc:AlternateContent xmlns:mc="http://schemas.openxmlformats.org/markup-compatibility/2006" xmlns:p14="http://schemas.microsoft.com/office/powerpoint/2010/main">
+          <mc:Choice Requires="p14">
+            <p:contentPart p14:bwMode="auto" r:id="rId9">
+              <p14:nvContentPartPr>
+                <p14:cNvPr id="9" name="Input penna 8">
+                  <a:extLst>
+                    <a:ext uri="{FF2B5EF4-FFF2-40B4-BE49-F238E27FC236}">
+                      <a16:creationId xmlns:a16="http://schemas.microsoft.com/office/drawing/2014/main" id="{EFD9CECB-5C05-3348-ADDC-4FDA92846A6E}"/>
+                    </a:ext>
+                  </a:extLst>
+                </p14:cNvPr>
+                <p14:cNvContentPartPr/>
+                <p14:nvPr/>
+              </p14:nvContentPartPr>
+              <p14:xfrm>
+                <a:off x="7891659" y="4430412"/>
+                <a:ext cx="360" cy="360"/>
+              </p14:xfrm>
+            </p:contentPart>
+          </mc:Choice>
+          <mc:Fallback xmlns="">
+            <p:pic>
+              <p:nvPicPr>
+                <p:cNvPr id="9" name="Input penna 8">
+                  <a:extLst>
+                    <a:ext uri="{FF2B5EF4-FFF2-40B4-BE49-F238E27FC236}">
+                      <a16:creationId xmlns:a16="http://schemas.microsoft.com/office/drawing/2014/main" id="{EFD9CECB-5C05-3348-ADDC-4FDA92846A6E}"/>
+                    </a:ext>
+                  </a:extLst>
+                </p:cNvPr>
+                <p:cNvPicPr/>
+                <p:nvPr/>
+              </p:nvPicPr>
+              <p:blipFill>
+                <a:blip r:embed="rId8"/>
+                <a:stretch>
+                  <a:fillRect/>
+                </a:stretch>
+              </p:blipFill>
+              <p:spPr>
+                <a:xfrm>
+                  <a:off x="7828659" y="4367772"/>
+                  <a:ext cx="126000" cy="126000"/>
+                </a:xfrm>
+                <a:prstGeom prst="rect">
+                  <a:avLst/>
+                </a:prstGeom>
+              </p:spPr>
+            </p:pic>
+          </mc:Fallback>
+        </mc:AlternateContent>
+        <mc:AlternateContent xmlns:mc="http://schemas.openxmlformats.org/markup-compatibility/2006" xmlns:p14="http://schemas.microsoft.com/office/powerpoint/2010/main">
+          <mc:Choice Requires="p14">
+            <p:contentPart p14:bwMode="auto" r:id="rId10">
+              <p14:nvContentPartPr>
+                <p14:cNvPr id="10" name="Input penna 9">
+                  <a:extLst>
+                    <a:ext uri="{FF2B5EF4-FFF2-40B4-BE49-F238E27FC236}">
+                      <a16:creationId xmlns:a16="http://schemas.microsoft.com/office/drawing/2014/main" id="{C7FBE63D-CC84-324C-8CBE-EE47524B6787}"/>
+                    </a:ext>
+                  </a:extLst>
+                </p14:cNvPr>
+                <p14:cNvContentPartPr/>
+                <p14:nvPr/>
+              </p14:nvContentPartPr>
+              <p14:xfrm>
+                <a:off x="7850619" y="4427532"/>
+                <a:ext cx="360" cy="360"/>
+              </p14:xfrm>
+            </p:contentPart>
+          </mc:Choice>
+          <mc:Fallback xmlns="">
+            <p:pic>
+              <p:nvPicPr>
+                <p:cNvPr id="10" name="Input penna 9">
+                  <a:extLst>
+                    <a:ext uri="{FF2B5EF4-FFF2-40B4-BE49-F238E27FC236}">
+                      <a16:creationId xmlns:a16="http://schemas.microsoft.com/office/drawing/2014/main" id="{C7FBE63D-CC84-324C-8CBE-EE47524B6787}"/>
+                    </a:ext>
+                  </a:extLst>
+                </p:cNvPr>
+                <p:cNvPicPr/>
+                <p:nvPr/>
+              </p:nvPicPr>
+              <p:blipFill>
+                <a:blip r:embed="rId8"/>
+                <a:stretch>
+                  <a:fillRect/>
+                </a:stretch>
+              </p:blipFill>
+              <p:spPr>
+                <a:xfrm>
+                  <a:off x="7787619" y="4364532"/>
+                  <a:ext cx="126000" cy="126000"/>
+                </a:xfrm>
+                <a:prstGeom prst="rect">
+                  <a:avLst/>
+                </a:prstGeom>
+              </p:spPr>
+            </p:pic>
+          </mc:Fallback>
+        </mc:AlternateContent>
+      </p:grpSp>
+      <p:grpSp>
+        <p:nvGrpSpPr>
+          <p:cNvPr id="14" name="Gruppo 13">
+            <a:extLst>
+              <a:ext uri="{FF2B5EF4-FFF2-40B4-BE49-F238E27FC236}">
+                <a16:creationId xmlns:a16="http://schemas.microsoft.com/office/drawing/2014/main" id="{7CC063CB-6A1F-FE48-93C5-AA78731C67E7}"/>
+              </a:ext>
+            </a:extLst>
+          </p:cNvPr>
+          <p:cNvGrpSpPr/>
+          <p:nvPr/>
+        </p:nvGrpSpPr>
+        <p:grpSpPr>
+          <a:xfrm>
+            <a:off x="8452179" y="4427532"/>
+            <a:ext cx="231120" cy="126720"/>
+            <a:chOff x="8452179" y="4427532"/>
+            <a:chExt cx="231120" cy="126720"/>
+          </a:xfrm>
+        </p:grpSpPr>
+        <mc:AlternateContent xmlns:mc="http://schemas.openxmlformats.org/markup-compatibility/2006" xmlns:p14="http://schemas.microsoft.com/office/powerpoint/2010/main">
+          <mc:Choice Requires="p14">
+            <p:contentPart p14:bwMode="auto" r:id="rId11">
+              <p14:nvContentPartPr>
+                <p14:cNvPr id="12" name="Input penna 11">
+                  <a:extLst>
+                    <a:ext uri="{FF2B5EF4-FFF2-40B4-BE49-F238E27FC236}">
+                      <a16:creationId xmlns:a16="http://schemas.microsoft.com/office/drawing/2014/main" id="{298DB9F0-CDEB-A742-868C-9284F7787053}"/>
+                    </a:ext>
+                  </a:extLst>
+                </p14:cNvPr>
+                <p14:cNvContentPartPr/>
+                <p14:nvPr/>
+              </p14:nvContentPartPr>
+              <p14:xfrm>
+                <a:off x="8640819" y="4427532"/>
+                <a:ext cx="42480" cy="126720"/>
+              </p14:xfrm>
+            </p:contentPart>
+          </mc:Choice>
+          <mc:Fallback xmlns="">
+            <p:pic>
+              <p:nvPicPr>
+                <p:cNvPr id="12" name="Input penna 11">
+                  <a:extLst>
+                    <a:ext uri="{FF2B5EF4-FFF2-40B4-BE49-F238E27FC236}">
+                      <a16:creationId xmlns:a16="http://schemas.microsoft.com/office/drawing/2014/main" id="{298DB9F0-CDEB-A742-868C-9284F7787053}"/>
+                    </a:ext>
+                  </a:extLst>
+                </p:cNvPr>
+                <p:cNvPicPr/>
+                <p:nvPr/>
+              </p:nvPicPr>
+              <p:blipFill>
+                <a:blip r:embed="rId12"/>
+                <a:stretch>
+                  <a:fillRect/>
+                </a:stretch>
+              </p:blipFill>
+              <p:spPr>
+                <a:xfrm>
+                  <a:off x="8578179" y="4364892"/>
+                  <a:ext cx="168120" cy="252360"/>
+                </a:xfrm>
+                <a:prstGeom prst="rect">
+                  <a:avLst/>
+                </a:prstGeom>
+              </p:spPr>
+            </p:pic>
+          </mc:Fallback>
+        </mc:AlternateContent>
+        <mc:AlternateContent xmlns:mc="http://schemas.openxmlformats.org/markup-compatibility/2006" xmlns:p14="http://schemas.microsoft.com/office/powerpoint/2010/main">
+          <mc:Choice Requires="p14">
+            <p:contentPart p14:bwMode="auto" r:id="rId13">
+              <p14:nvContentPartPr>
+                <p14:cNvPr id="13" name="Input penna 12">
+                  <a:extLst>
+                    <a:ext uri="{FF2B5EF4-FFF2-40B4-BE49-F238E27FC236}">
+                      <a16:creationId xmlns:a16="http://schemas.microsoft.com/office/drawing/2014/main" id="{FE2939E9-93D7-8145-8D23-36668BC4FED6}"/>
+                    </a:ext>
+                  </a:extLst>
+                </p14:cNvPr>
+                <p14:cNvContentPartPr/>
+                <p14:nvPr/>
+              </p14:nvContentPartPr>
+              <p14:xfrm>
+                <a:off x="8452179" y="4466772"/>
+                <a:ext cx="360" cy="360"/>
+              </p14:xfrm>
+            </p:contentPart>
+          </mc:Choice>
+          <mc:Fallback xmlns="">
+            <p:pic>
+              <p:nvPicPr>
+                <p:cNvPr id="13" name="Input penna 12">
+                  <a:extLst>
+                    <a:ext uri="{FF2B5EF4-FFF2-40B4-BE49-F238E27FC236}">
+                      <a16:creationId xmlns:a16="http://schemas.microsoft.com/office/drawing/2014/main" id="{FE2939E9-93D7-8145-8D23-36668BC4FED6}"/>
+                    </a:ext>
+                  </a:extLst>
+                </p:cNvPr>
+                <p:cNvPicPr/>
+                <p:nvPr/>
+              </p:nvPicPr>
+              <p:blipFill>
+                <a:blip r:embed="rId8"/>
+                <a:stretch>
+                  <a:fillRect/>
+                </a:stretch>
+              </p:blipFill>
+              <p:spPr>
+                <a:xfrm>
+                  <a:off x="8389179" y="4403772"/>
+                  <a:ext cx="126000" cy="126000"/>
+                </a:xfrm>
+                <a:prstGeom prst="rect">
+                  <a:avLst/>
+                </a:prstGeom>
+              </p:spPr>
+            </p:pic>
+          </mc:Fallback>
+        </mc:AlternateContent>
+      </p:grpSp>
+      <mc:AlternateContent xmlns:mc="http://schemas.openxmlformats.org/markup-compatibility/2006" xmlns:p14="http://schemas.microsoft.com/office/powerpoint/2010/main">
+        <mc:Choice Requires="p14">
+          <p:contentPart p14:bwMode="auto" r:id="rId14">
+            <p14:nvContentPartPr>
+              <p14:cNvPr id="15" name="Input penna 14">
+                <a:extLst>
+                  <a:ext uri="{FF2B5EF4-FFF2-40B4-BE49-F238E27FC236}">
+                    <a16:creationId xmlns:a16="http://schemas.microsoft.com/office/drawing/2014/main" id="{186A9270-187E-5846-97E0-50113DDFEA86}"/>
+                  </a:ext>
+                </a:extLst>
+              </p14:cNvPr>
+              <p14:cNvContentPartPr/>
+              <p14:nvPr/>
+            </p14:nvContentPartPr>
+            <p14:xfrm>
+              <a:off x="9291339" y="4435092"/>
+              <a:ext cx="360" cy="360"/>
+            </p14:xfrm>
+          </p:contentPart>
+        </mc:Choice>
+        <mc:Fallback xmlns="">
+          <p:pic>
+            <p:nvPicPr>
+              <p:cNvPr id="15" name="Input penna 14">
+                <a:extLst>
+                  <a:ext uri="{FF2B5EF4-FFF2-40B4-BE49-F238E27FC236}">
+                    <a16:creationId xmlns:a16="http://schemas.microsoft.com/office/drawing/2014/main" id="{186A9270-187E-5846-97E0-50113DDFEA86}"/>
+                  </a:ext>
+                </a:extLst>
+              </p:cNvPr>
+              <p:cNvPicPr/>
+              <p:nvPr/>
+            </p:nvPicPr>
+            <p:blipFill>
+              <a:blip r:embed="rId8"/>
+              <a:stretch>
+                <a:fillRect/>
+              </a:stretch>
+            </p:blipFill>
+            <p:spPr>
+              <a:xfrm>
+                <a:off x="9228339" y="4372092"/>
+                <a:ext cx="126000" cy="126000"/>
+              </a:xfrm>
+              <a:prstGeom prst="rect">
+                <a:avLst/>
+              </a:prstGeom>
+            </p:spPr>
+          </p:pic>
+        </mc:Fallback>
+      </mc:AlternateContent>
+      <mc:AlternateContent xmlns:mc="http://schemas.openxmlformats.org/markup-compatibility/2006" xmlns:p14="http://schemas.microsoft.com/office/powerpoint/2010/main">
+        <mc:Choice Requires="p14">
+          <p:contentPart p14:bwMode="auto" r:id="rId15">
+            <p14:nvContentPartPr>
+              <p14:cNvPr id="16" name="Input penna 15">
+                <a:extLst>
+                  <a:ext uri="{FF2B5EF4-FFF2-40B4-BE49-F238E27FC236}">
+                    <a16:creationId xmlns:a16="http://schemas.microsoft.com/office/drawing/2014/main" id="{ADA9B42C-D44A-9C4F-A463-A21EBAEA598A}"/>
+                  </a:ext>
+                </a:extLst>
+              </p14:cNvPr>
+              <p14:cNvContentPartPr/>
+              <p14:nvPr/>
+            </p14:nvContentPartPr>
+            <p14:xfrm>
+              <a:off x="9614619" y="4459212"/>
+              <a:ext cx="360" cy="360"/>
+            </p14:xfrm>
+          </p:contentPart>
+        </mc:Choice>
+        <mc:Fallback xmlns="">
+          <p:pic>
+            <p:nvPicPr>
+              <p:cNvPr id="16" name="Input penna 15">
+                <a:extLst>
+                  <a:ext uri="{FF2B5EF4-FFF2-40B4-BE49-F238E27FC236}">
+                    <a16:creationId xmlns:a16="http://schemas.microsoft.com/office/drawing/2014/main" id="{ADA9B42C-D44A-9C4F-A463-A21EBAEA598A}"/>
+                  </a:ext>
+                </a:extLst>
+              </p:cNvPr>
+              <p:cNvPicPr/>
+              <p:nvPr/>
+            </p:nvPicPr>
+            <p:blipFill>
+              <a:blip r:embed="rId8"/>
+              <a:stretch>
+                <a:fillRect/>
+              </a:stretch>
+            </p:blipFill>
+            <p:spPr>
+              <a:xfrm>
+                <a:off x="9551619" y="4396212"/>
+                <a:ext cx="126000" cy="126000"/>
+              </a:xfrm>
+              <a:prstGeom prst="rect">
+                <a:avLst/>
+              </a:prstGeom>
+            </p:spPr>
+          </p:pic>
+        </mc:Fallback>
+      </mc:AlternateContent>
+      <mc:AlternateContent xmlns:mc="http://schemas.openxmlformats.org/markup-compatibility/2006" xmlns:p14="http://schemas.microsoft.com/office/powerpoint/2010/main">
+        <mc:Choice Requires="p14">
+          <p:contentPart p14:bwMode="auto" r:id="rId16">
+            <p14:nvContentPartPr>
+              <p14:cNvPr id="17" name="Input penna 16">
+                <a:extLst>
+                  <a:ext uri="{FF2B5EF4-FFF2-40B4-BE49-F238E27FC236}">
+                    <a16:creationId xmlns:a16="http://schemas.microsoft.com/office/drawing/2014/main" id="{9AC0AAB0-3FDC-184D-8CE7-153B5C5F684C}"/>
+                  </a:ext>
+                </a:extLst>
+              </p14:cNvPr>
+              <p14:cNvContentPartPr/>
+              <p14:nvPr/>
+            </p14:nvContentPartPr>
+            <p14:xfrm>
+              <a:off x="9814779" y="4454532"/>
+              <a:ext cx="158760" cy="97560"/>
+            </p14:xfrm>
+          </p:contentPart>
+        </mc:Choice>
+        <mc:Fallback xmlns="">
+          <p:pic>
+            <p:nvPicPr>
+              <p:cNvPr id="17" name="Input penna 16">
+                <a:extLst>
+                  <a:ext uri="{FF2B5EF4-FFF2-40B4-BE49-F238E27FC236}">
+                    <a16:creationId xmlns:a16="http://schemas.microsoft.com/office/drawing/2014/main" id="{9AC0AAB0-3FDC-184D-8CE7-153B5C5F684C}"/>
+                  </a:ext>
+                </a:extLst>
+              </p:cNvPr>
+              <p:cNvPicPr/>
+              <p:nvPr/>
+            </p:nvPicPr>
+            <p:blipFill>
+              <a:blip r:embed="rId17"/>
+              <a:stretch>
+                <a:fillRect/>
+              </a:stretch>
+            </p:blipFill>
+            <p:spPr>
+              <a:xfrm>
+                <a:off x="9751779" y="4391532"/>
+                <a:ext cx="284400" cy="223200"/>
+              </a:xfrm>
+              <a:prstGeom prst="rect">
+                <a:avLst/>
+              </a:prstGeom>
+            </p:spPr>
+          </p:pic>
+        </mc:Fallback>
+      </mc:AlternateContent>
+      <mc:AlternateContent xmlns:mc="http://schemas.openxmlformats.org/markup-compatibility/2006" xmlns:p14="http://schemas.microsoft.com/office/powerpoint/2010/main">
+        <mc:Choice Requires="p14">
+          <p:contentPart p14:bwMode="auto" r:id="rId18">
+            <p14:nvContentPartPr>
+              <p14:cNvPr id="18" name="Input penna 17">
+                <a:extLst>
+                  <a:ext uri="{FF2B5EF4-FFF2-40B4-BE49-F238E27FC236}">
+                    <a16:creationId xmlns:a16="http://schemas.microsoft.com/office/drawing/2014/main" id="{5478B076-4CE0-B14B-9540-6EBECCD654D9}"/>
+                  </a:ext>
+                </a:extLst>
+              </p14:cNvPr>
+              <p14:cNvContentPartPr/>
+              <p14:nvPr/>
+            </p14:nvContentPartPr>
+            <p14:xfrm>
+              <a:off x="10052019" y="4414572"/>
+              <a:ext cx="118800" cy="80640"/>
+            </p14:xfrm>
+          </p:contentPart>
+        </mc:Choice>
+        <mc:Fallback xmlns="">
+          <p:pic>
+            <p:nvPicPr>
+              <p:cNvPr id="18" name="Input penna 17">
+                <a:extLst>
+                  <a:ext uri="{FF2B5EF4-FFF2-40B4-BE49-F238E27FC236}">
+                    <a16:creationId xmlns:a16="http://schemas.microsoft.com/office/drawing/2014/main" id="{5478B076-4CE0-B14B-9540-6EBECCD654D9}"/>
+                  </a:ext>
+                </a:extLst>
+              </p:cNvPr>
+              <p:cNvPicPr/>
+              <p:nvPr/>
+            </p:nvPicPr>
+            <p:blipFill>
+              <a:blip r:embed="rId19"/>
+              <a:stretch>
+                <a:fillRect/>
+              </a:stretch>
+            </p:blipFill>
+            <p:spPr>
+              <a:xfrm>
+                <a:off x="9989379" y="4351932"/>
+                <a:ext cx="244440" cy="206280"/>
+              </a:xfrm>
+              <a:prstGeom prst="rect">
+                <a:avLst/>
+              </a:prstGeom>
+            </p:spPr>
+          </p:pic>
+        </mc:Fallback>
+      </mc:AlternateContent>
+      <p:grpSp>
+        <p:nvGrpSpPr>
+          <p:cNvPr id="29" name="Gruppo 28">
+            <a:extLst>
+              <a:ext uri="{FF2B5EF4-FFF2-40B4-BE49-F238E27FC236}">
+                <a16:creationId xmlns:a16="http://schemas.microsoft.com/office/drawing/2014/main" id="{9AD243AE-FE2A-4644-8FB1-390085938FDB}"/>
+              </a:ext>
+            </a:extLst>
+          </p:cNvPr>
+          <p:cNvGrpSpPr/>
+          <p:nvPr/>
+        </p:nvGrpSpPr>
+        <p:grpSpPr>
+          <a:xfrm>
+            <a:off x="10365219" y="4346172"/>
+            <a:ext cx="401400" cy="212400"/>
+            <a:chOff x="10365219" y="4346172"/>
+            <a:chExt cx="401400" cy="212400"/>
+          </a:xfrm>
+        </p:grpSpPr>
+        <mc:AlternateContent xmlns:mc="http://schemas.openxmlformats.org/markup-compatibility/2006" xmlns:p14="http://schemas.microsoft.com/office/powerpoint/2010/main">
+          <mc:Choice Requires="p14">
+            <p:contentPart p14:bwMode="auto" r:id="rId20">
+              <p14:nvContentPartPr>
+                <p14:cNvPr id="20" name="Input penna 19">
+                  <a:extLst>
+                    <a:ext uri="{FF2B5EF4-FFF2-40B4-BE49-F238E27FC236}">
+                      <a16:creationId xmlns:a16="http://schemas.microsoft.com/office/drawing/2014/main" id="{D00D3FFC-351E-EA4F-AF9F-2EFC98899FA5}"/>
+                    </a:ext>
+                  </a:extLst>
+                </p14:cNvPr>
+                <p14:cNvContentPartPr/>
+                <p14:nvPr/>
+              </p14:nvContentPartPr>
+              <p14:xfrm>
+                <a:off x="10580139" y="4346172"/>
+                <a:ext cx="186480" cy="212400"/>
+              </p14:xfrm>
+            </p:contentPart>
+          </mc:Choice>
+          <mc:Fallback xmlns="">
+            <p:pic>
+              <p:nvPicPr>
+                <p:cNvPr id="20" name="Input penna 19">
+                  <a:extLst>
+                    <a:ext uri="{FF2B5EF4-FFF2-40B4-BE49-F238E27FC236}">
+                      <a16:creationId xmlns:a16="http://schemas.microsoft.com/office/drawing/2014/main" id="{D00D3FFC-351E-EA4F-AF9F-2EFC98899FA5}"/>
+                    </a:ext>
+                  </a:extLst>
+                </p:cNvPr>
+                <p:cNvPicPr/>
+                <p:nvPr/>
+              </p:nvPicPr>
+              <p:blipFill>
+                <a:blip r:embed="rId21"/>
+                <a:stretch>
+                  <a:fillRect/>
+                </a:stretch>
+              </p:blipFill>
+              <p:spPr>
+                <a:xfrm>
+                  <a:off x="10517499" y="4283172"/>
+                  <a:ext cx="312120" cy="338040"/>
+                </a:xfrm>
+                <a:prstGeom prst="rect">
+                  <a:avLst/>
+                </a:prstGeom>
+              </p:spPr>
+            </p:pic>
+          </mc:Fallback>
+        </mc:AlternateContent>
+        <mc:AlternateContent xmlns:mc="http://schemas.openxmlformats.org/markup-compatibility/2006" xmlns:p14="http://schemas.microsoft.com/office/powerpoint/2010/main">
+          <mc:Choice Requires="p14">
+            <p:contentPart p14:bwMode="auto" r:id="rId22">
+              <p14:nvContentPartPr>
+                <p14:cNvPr id="21" name="Input penna 20">
+                  <a:extLst>
+                    <a:ext uri="{FF2B5EF4-FFF2-40B4-BE49-F238E27FC236}">
+                      <a16:creationId xmlns:a16="http://schemas.microsoft.com/office/drawing/2014/main" id="{1633408F-4E5D-814D-BD81-9D1ECB77CAAC}"/>
+                    </a:ext>
+                  </a:extLst>
+                </p14:cNvPr>
+                <p14:cNvContentPartPr/>
+                <p14:nvPr/>
+              </p14:nvContentPartPr>
+              <p14:xfrm>
+                <a:off x="10511379" y="4457412"/>
+                <a:ext cx="360" cy="360"/>
+              </p14:xfrm>
+            </p:contentPart>
+          </mc:Choice>
+          <mc:Fallback xmlns="">
+            <p:pic>
+              <p:nvPicPr>
+                <p:cNvPr id="21" name="Input penna 20">
+                  <a:extLst>
+                    <a:ext uri="{FF2B5EF4-FFF2-40B4-BE49-F238E27FC236}">
+                      <a16:creationId xmlns:a16="http://schemas.microsoft.com/office/drawing/2014/main" id="{1633408F-4E5D-814D-BD81-9D1ECB77CAAC}"/>
+                    </a:ext>
+                  </a:extLst>
+                </p:cNvPr>
+                <p:cNvPicPr/>
+                <p:nvPr/>
+              </p:nvPicPr>
+              <p:blipFill>
+                <a:blip r:embed="rId8"/>
+                <a:stretch>
+                  <a:fillRect/>
+                </a:stretch>
+              </p:blipFill>
+              <p:spPr>
+                <a:xfrm>
+                  <a:off x="10448379" y="4394412"/>
+                  <a:ext cx="126000" cy="126000"/>
+                </a:xfrm>
+                <a:prstGeom prst="rect">
+                  <a:avLst/>
+                </a:prstGeom>
+              </p:spPr>
+            </p:pic>
+          </mc:Fallback>
+        </mc:AlternateContent>
+        <mc:AlternateContent xmlns:mc="http://schemas.openxmlformats.org/markup-compatibility/2006" xmlns:p14="http://schemas.microsoft.com/office/powerpoint/2010/main">
+          <mc:Choice Requires="p14">
+            <p:contentPart p14:bwMode="auto" r:id="rId23">
+              <p14:nvContentPartPr>
+                <p14:cNvPr id="22" name="Input penna 21">
+                  <a:extLst>
+                    <a:ext uri="{FF2B5EF4-FFF2-40B4-BE49-F238E27FC236}">
+                      <a16:creationId xmlns:a16="http://schemas.microsoft.com/office/drawing/2014/main" id="{5B91324C-6EED-BA41-8084-5DEAA7E905EE}"/>
+                    </a:ext>
+                  </a:extLst>
+                </p14:cNvPr>
+                <p14:cNvContentPartPr/>
+                <p14:nvPr/>
+              </p14:nvContentPartPr>
+              <p14:xfrm>
+                <a:off x="10523259" y="4459572"/>
+                <a:ext cx="360" cy="360"/>
+              </p14:xfrm>
+            </p:contentPart>
+          </mc:Choice>
+          <mc:Fallback xmlns="">
+            <p:pic>
+              <p:nvPicPr>
+                <p:cNvPr id="22" name="Input penna 21">
+                  <a:extLst>
+                    <a:ext uri="{FF2B5EF4-FFF2-40B4-BE49-F238E27FC236}">
+                      <a16:creationId xmlns:a16="http://schemas.microsoft.com/office/drawing/2014/main" id="{5B91324C-6EED-BA41-8084-5DEAA7E905EE}"/>
+                    </a:ext>
+                  </a:extLst>
+                </p:cNvPr>
+                <p:cNvPicPr/>
+                <p:nvPr/>
+              </p:nvPicPr>
+              <p:blipFill>
+                <a:blip r:embed="rId8"/>
+                <a:stretch>
+                  <a:fillRect/>
+                </a:stretch>
+              </p:blipFill>
+              <p:spPr>
+                <a:xfrm>
+                  <a:off x="10460259" y="4396932"/>
+                  <a:ext cx="126000" cy="126000"/>
+                </a:xfrm>
+                <a:prstGeom prst="rect">
+                  <a:avLst/>
+                </a:prstGeom>
+              </p:spPr>
+            </p:pic>
+          </mc:Fallback>
+        </mc:AlternateContent>
+        <mc:AlternateContent xmlns:mc="http://schemas.openxmlformats.org/markup-compatibility/2006" xmlns:p14="http://schemas.microsoft.com/office/powerpoint/2010/main">
+          <mc:Choice Requires="p14">
+            <p:contentPart p14:bwMode="auto" r:id="rId24">
+              <p14:nvContentPartPr>
+                <p14:cNvPr id="24" name="Input penna 23">
+                  <a:extLst>
+                    <a:ext uri="{FF2B5EF4-FFF2-40B4-BE49-F238E27FC236}">
+                      <a16:creationId xmlns:a16="http://schemas.microsoft.com/office/drawing/2014/main" id="{25707B20-15BA-374C-861D-790993B28419}"/>
+                    </a:ext>
+                  </a:extLst>
+                </p14:cNvPr>
+                <p14:cNvContentPartPr/>
+                <p14:nvPr/>
+              </p14:nvContentPartPr>
+              <p14:xfrm>
+                <a:off x="10365219" y="4458132"/>
+                <a:ext cx="360" cy="360"/>
+              </p14:xfrm>
+            </p:contentPart>
+          </mc:Choice>
+          <mc:Fallback xmlns="">
+            <p:pic>
+              <p:nvPicPr>
+                <p:cNvPr id="24" name="Input penna 23">
+                  <a:extLst>
+                    <a:ext uri="{FF2B5EF4-FFF2-40B4-BE49-F238E27FC236}">
+                      <a16:creationId xmlns:a16="http://schemas.microsoft.com/office/drawing/2014/main" id="{25707B20-15BA-374C-861D-790993B28419}"/>
+                    </a:ext>
+                  </a:extLst>
+                </p:cNvPr>
+                <p:cNvPicPr/>
+                <p:nvPr/>
+              </p:nvPicPr>
+              <p:blipFill>
+                <a:blip r:embed="rId8"/>
+                <a:stretch>
+                  <a:fillRect/>
+                </a:stretch>
+              </p:blipFill>
+              <p:spPr>
+                <a:xfrm>
+                  <a:off x="10302579" y="4395492"/>
+                  <a:ext cx="126000" cy="126000"/>
+                </a:xfrm>
+                <a:prstGeom prst="rect">
+                  <a:avLst/>
+                </a:prstGeom>
+              </p:spPr>
+            </p:pic>
+          </mc:Fallback>
+        </mc:AlternateContent>
+        <mc:AlternateContent xmlns:mc="http://schemas.openxmlformats.org/markup-compatibility/2006" xmlns:p14="http://schemas.microsoft.com/office/powerpoint/2010/main">
+          <mc:Choice Requires="p14">
+            <p:contentPart p14:bwMode="auto" r:id="rId25">
+              <p14:nvContentPartPr>
+                <p14:cNvPr id="25" name="Input penna 24">
+                  <a:extLst>
+                    <a:ext uri="{FF2B5EF4-FFF2-40B4-BE49-F238E27FC236}">
+                      <a16:creationId xmlns:a16="http://schemas.microsoft.com/office/drawing/2014/main" id="{46F325BB-413E-464A-AE7D-95629DE11A30}"/>
+                    </a:ext>
+                  </a:extLst>
+                </p14:cNvPr>
+                <p14:cNvContentPartPr/>
+                <p14:nvPr/>
+              </p14:nvContentPartPr>
+              <p14:xfrm>
+                <a:off x="10365219" y="4458132"/>
+                <a:ext cx="360" cy="360"/>
+              </p14:xfrm>
+            </p:contentPart>
+          </mc:Choice>
+          <mc:Fallback xmlns="">
+            <p:pic>
+              <p:nvPicPr>
+                <p:cNvPr id="25" name="Input penna 24">
+                  <a:extLst>
+                    <a:ext uri="{FF2B5EF4-FFF2-40B4-BE49-F238E27FC236}">
+                      <a16:creationId xmlns:a16="http://schemas.microsoft.com/office/drawing/2014/main" id="{46F325BB-413E-464A-AE7D-95629DE11A30}"/>
+                    </a:ext>
+                  </a:extLst>
+                </p:cNvPr>
+                <p:cNvPicPr/>
+                <p:nvPr/>
+              </p:nvPicPr>
+              <p:blipFill>
+                <a:blip r:embed="rId8"/>
+                <a:stretch>
+                  <a:fillRect/>
+                </a:stretch>
+              </p:blipFill>
+              <p:spPr>
+                <a:xfrm>
+                  <a:off x="10302579" y="4395492"/>
+                  <a:ext cx="126000" cy="126000"/>
+                </a:xfrm>
+                <a:prstGeom prst="rect">
+                  <a:avLst/>
+                </a:prstGeom>
+              </p:spPr>
+            </p:pic>
+          </mc:Fallback>
+        </mc:AlternateContent>
+        <mc:AlternateContent xmlns:mc="http://schemas.openxmlformats.org/markup-compatibility/2006" xmlns:p14="http://schemas.microsoft.com/office/powerpoint/2010/main">
+          <mc:Choice Requires="p14">
+            <p:contentPart p14:bwMode="auto" r:id="rId26">
+              <p14:nvContentPartPr>
+                <p14:cNvPr id="27" name="Input penna 26">
+                  <a:extLst>
+                    <a:ext uri="{FF2B5EF4-FFF2-40B4-BE49-F238E27FC236}">
+                      <a16:creationId xmlns:a16="http://schemas.microsoft.com/office/drawing/2014/main" id="{177EFBEE-5864-A74A-AF03-62ACA2C7E581}"/>
+                    </a:ext>
+                  </a:extLst>
+                </p14:cNvPr>
+                <p14:cNvContentPartPr/>
+                <p14:nvPr/>
+              </p14:nvContentPartPr>
+              <p14:xfrm>
+                <a:off x="10602099" y="4457412"/>
+                <a:ext cx="360" cy="360"/>
+              </p14:xfrm>
+            </p:contentPart>
+          </mc:Choice>
+          <mc:Fallback xmlns="">
+            <p:pic>
+              <p:nvPicPr>
+                <p:cNvPr id="27" name="Input penna 26">
+                  <a:extLst>
+                    <a:ext uri="{FF2B5EF4-FFF2-40B4-BE49-F238E27FC236}">
+                      <a16:creationId xmlns:a16="http://schemas.microsoft.com/office/drawing/2014/main" id="{177EFBEE-5864-A74A-AF03-62ACA2C7E581}"/>
+                    </a:ext>
+                  </a:extLst>
+                </p:cNvPr>
+                <p:cNvPicPr/>
+                <p:nvPr/>
+              </p:nvPicPr>
+              <p:blipFill>
+                <a:blip r:embed="rId8"/>
+                <a:stretch>
+                  <a:fillRect/>
+                </a:stretch>
+              </p:blipFill>
+              <p:spPr>
+                <a:xfrm>
+                  <a:off x="10539099" y="4394772"/>
+                  <a:ext cx="126000" cy="126000"/>
+                </a:xfrm>
+                <a:prstGeom prst="rect">
+                  <a:avLst/>
+                </a:prstGeom>
+              </p:spPr>
+            </p:pic>
+          </mc:Fallback>
+        </mc:AlternateContent>
+        <mc:AlternateContent xmlns:mc="http://schemas.openxmlformats.org/markup-compatibility/2006" xmlns:p14="http://schemas.microsoft.com/office/powerpoint/2010/main">
+          <mc:Choice Requires="p14">
+            <p:contentPart p14:bwMode="auto" r:id="rId27">
+              <p14:nvContentPartPr>
+                <p14:cNvPr id="28" name="Input penna 27">
+                  <a:extLst>
+                    <a:ext uri="{FF2B5EF4-FFF2-40B4-BE49-F238E27FC236}">
+                      <a16:creationId xmlns:a16="http://schemas.microsoft.com/office/drawing/2014/main" id="{A6DEF47B-D1DC-974D-B4EA-B0D0ADA1CF82}"/>
+                    </a:ext>
+                  </a:extLst>
+                </p14:cNvPr>
+                <p14:cNvContentPartPr/>
+                <p14:nvPr/>
+              </p14:nvContentPartPr>
+              <p14:xfrm>
+                <a:off x="10602099" y="4457412"/>
+                <a:ext cx="360" cy="360"/>
+              </p14:xfrm>
+            </p:contentPart>
+          </mc:Choice>
+          <mc:Fallback xmlns="">
+            <p:pic>
+              <p:nvPicPr>
+                <p:cNvPr id="28" name="Input penna 27">
+                  <a:extLst>
+                    <a:ext uri="{FF2B5EF4-FFF2-40B4-BE49-F238E27FC236}">
+                      <a16:creationId xmlns:a16="http://schemas.microsoft.com/office/drawing/2014/main" id="{A6DEF47B-D1DC-974D-B4EA-B0D0ADA1CF82}"/>
+                    </a:ext>
+                  </a:extLst>
+                </p:cNvPr>
+                <p:cNvPicPr/>
+                <p:nvPr/>
+              </p:nvPicPr>
+              <p:blipFill>
+                <a:blip r:embed="rId8"/>
+                <a:stretch>
+                  <a:fillRect/>
+                </a:stretch>
+              </p:blipFill>
+              <p:spPr>
+                <a:xfrm>
+                  <a:off x="10539099" y="4394772"/>
+                  <a:ext cx="126000" cy="126000"/>
+                </a:xfrm>
+                <a:prstGeom prst="rect">
+                  <a:avLst/>
+                </a:prstGeom>
+              </p:spPr>
+            </p:pic>
+          </mc:Fallback>
+        </mc:AlternateContent>
+      </p:grpSp>
+      <p:grpSp>
+        <p:nvGrpSpPr>
+          <p:cNvPr id="38" name="Gruppo 37">
+            <a:extLst>
+              <a:ext uri="{FF2B5EF4-FFF2-40B4-BE49-F238E27FC236}">
+                <a16:creationId xmlns:a16="http://schemas.microsoft.com/office/drawing/2014/main" id="{931D1200-52C3-694C-B7E6-0C04365720F9}"/>
+              </a:ext>
+            </a:extLst>
+          </p:cNvPr>
+          <p:cNvGrpSpPr/>
+          <p:nvPr/>
+        </p:nvGrpSpPr>
+        <p:grpSpPr>
+          <a:xfrm>
+            <a:off x="9812979" y="4457772"/>
+            <a:ext cx="100080" cy="7560"/>
+            <a:chOff x="9812979" y="4457772"/>
+            <a:chExt cx="100080" cy="7560"/>
+          </a:xfrm>
+        </p:grpSpPr>
+        <mc:AlternateContent xmlns:mc="http://schemas.openxmlformats.org/markup-compatibility/2006" xmlns:p14="http://schemas.microsoft.com/office/powerpoint/2010/main">
+          <mc:Choice Requires="p14">
+            <p:contentPart p14:bwMode="auto" r:id="rId28">
+              <p14:nvContentPartPr>
+                <p14:cNvPr id="30" name="Input penna 29">
+                  <a:extLst>
+                    <a:ext uri="{FF2B5EF4-FFF2-40B4-BE49-F238E27FC236}">
+                      <a16:creationId xmlns:a16="http://schemas.microsoft.com/office/drawing/2014/main" id="{97F30865-CD75-A34F-B3E6-666AD8D02B59}"/>
+                    </a:ext>
+                  </a:extLst>
+                </p14:cNvPr>
+                <p14:cNvContentPartPr/>
+                <p14:nvPr/>
+              </p14:nvContentPartPr>
+              <p14:xfrm>
+                <a:off x="9814419" y="4464972"/>
+                <a:ext cx="360" cy="360"/>
+              </p14:xfrm>
+            </p:contentPart>
+          </mc:Choice>
+          <mc:Fallback xmlns="">
+            <p:pic>
+              <p:nvPicPr>
+                <p:cNvPr id="30" name="Input penna 29">
+                  <a:extLst>
+                    <a:ext uri="{FF2B5EF4-FFF2-40B4-BE49-F238E27FC236}">
+                      <a16:creationId xmlns:a16="http://schemas.microsoft.com/office/drawing/2014/main" id="{97F30865-CD75-A34F-B3E6-666AD8D02B59}"/>
+                    </a:ext>
+                  </a:extLst>
+                </p:cNvPr>
+                <p:cNvPicPr/>
+                <p:nvPr/>
+              </p:nvPicPr>
+              <p:blipFill>
+                <a:blip r:embed="rId8"/>
+                <a:stretch>
+                  <a:fillRect/>
+                </a:stretch>
+              </p:blipFill>
+              <p:spPr>
+                <a:xfrm>
+                  <a:off x="9751419" y="4401972"/>
+                  <a:ext cx="126000" cy="126000"/>
+                </a:xfrm>
+                <a:prstGeom prst="rect">
+                  <a:avLst/>
+                </a:prstGeom>
+              </p:spPr>
+            </p:pic>
+          </mc:Fallback>
+        </mc:AlternateContent>
+        <mc:AlternateContent xmlns:mc="http://schemas.openxmlformats.org/markup-compatibility/2006" xmlns:p14="http://schemas.microsoft.com/office/powerpoint/2010/main">
+          <mc:Choice Requires="p14">
+            <p:contentPart p14:bwMode="auto" r:id="rId29">
+              <p14:nvContentPartPr>
+                <p14:cNvPr id="31" name="Input penna 30">
+                  <a:extLst>
+                    <a:ext uri="{FF2B5EF4-FFF2-40B4-BE49-F238E27FC236}">
+                      <a16:creationId xmlns:a16="http://schemas.microsoft.com/office/drawing/2014/main" id="{88E22F73-D29C-9141-AD85-2D7939F67A92}"/>
+                    </a:ext>
+                  </a:extLst>
+                </p14:cNvPr>
+                <p14:cNvContentPartPr/>
+                <p14:nvPr/>
+              </p14:nvContentPartPr>
+              <p14:xfrm>
+                <a:off x="9817659" y="4464972"/>
+                <a:ext cx="360" cy="360"/>
+              </p14:xfrm>
+            </p:contentPart>
+          </mc:Choice>
+          <mc:Fallback xmlns="">
+            <p:pic>
+              <p:nvPicPr>
+                <p:cNvPr id="31" name="Input penna 30">
+                  <a:extLst>
+                    <a:ext uri="{FF2B5EF4-FFF2-40B4-BE49-F238E27FC236}">
+                      <a16:creationId xmlns:a16="http://schemas.microsoft.com/office/drawing/2014/main" id="{88E22F73-D29C-9141-AD85-2D7939F67A92}"/>
+                    </a:ext>
+                  </a:extLst>
+                </p:cNvPr>
+                <p:cNvPicPr/>
+                <p:nvPr/>
+              </p:nvPicPr>
+              <p:blipFill>
+                <a:blip r:embed="rId8"/>
+                <a:stretch>
+                  <a:fillRect/>
+                </a:stretch>
+              </p:blipFill>
+              <p:spPr>
+                <a:xfrm>
+                  <a:off x="9755019" y="4401972"/>
+                  <a:ext cx="126000" cy="126000"/>
+                </a:xfrm>
+                <a:prstGeom prst="rect">
+                  <a:avLst/>
+                </a:prstGeom>
+              </p:spPr>
+            </p:pic>
+          </mc:Fallback>
+        </mc:AlternateContent>
+        <mc:AlternateContent xmlns:mc="http://schemas.openxmlformats.org/markup-compatibility/2006" xmlns:p14="http://schemas.microsoft.com/office/powerpoint/2010/main">
+          <mc:Choice Requires="p14">
+            <p:contentPart p14:bwMode="auto" r:id="rId30">
+              <p14:nvContentPartPr>
+                <p14:cNvPr id="33" name="Input penna 32">
+                  <a:extLst>
+                    <a:ext uri="{FF2B5EF4-FFF2-40B4-BE49-F238E27FC236}">
+                      <a16:creationId xmlns:a16="http://schemas.microsoft.com/office/drawing/2014/main" id="{439674E4-3B6F-A046-9C7C-52702E3B80B4}"/>
+                    </a:ext>
+                  </a:extLst>
+                </p14:cNvPr>
+                <p14:cNvContentPartPr/>
+                <p14:nvPr/>
+              </p14:nvContentPartPr>
+              <p14:xfrm>
+                <a:off x="9905859" y="4457772"/>
+                <a:ext cx="360" cy="360"/>
+              </p14:xfrm>
+            </p:contentPart>
+          </mc:Choice>
+          <mc:Fallback xmlns="">
+            <p:pic>
+              <p:nvPicPr>
+                <p:cNvPr id="33" name="Input penna 32">
+                  <a:extLst>
+                    <a:ext uri="{FF2B5EF4-FFF2-40B4-BE49-F238E27FC236}">
+                      <a16:creationId xmlns:a16="http://schemas.microsoft.com/office/drawing/2014/main" id="{439674E4-3B6F-A046-9C7C-52702E3B80B4}"/>
+                    </a:ext>
+                  </a:extLst>
+                </p:cNvPr>
+                <p:cNvPicPr/>
+                <p:nvPr/>
+              </p:nvPicPr>
+              <p:blipFill>
+                <a:blip r:embed="rId8"/>
+                <a:stretch>
+                  <a:fillRect/>
+                </a:stretch>
+              </p:blipFill>
+              <p:spPr>
+                <a:xfrm>
+                  <a:off x="9842859" y="4394772"/>
+                  <a:ext cx="126000" cy="126000"/>
+                </a:xfrm>
+                <a:prstGeom prst="rect">
+                  <a:avLst/>
+                </a:prstGeom>
+              </p:spPr>
+            </p:pic>
+          </mc:Fallback>
+        </mc:AlternateContent>
+        <mc:AlternateContent xmlns:mc="http://schemas.openxmlformats.org/markup-compatibility/2006" xmlns:p14="http://schemas.microsoft.com/office/powerpoint/2010/main">
+          <mc:Choice Requires="p14">
+            <p:contentPart p14:bwMode="auto" r:id="rId31">
+              <p14:nvContentPartPr>
+                <p14:cNvPr id="34" name="Input penna 33">
+                  <a:extLst>
+                    <a:ext uri="{FF2B5EF4-FFF2-40B4-BE49-F238E27FC236}">
+                      <a16:creationId xmlns:a16="http://schemas.microsoft.com/office/drawing/2014/main" id="{B5D6E831-F232-7048-B904-BE5A012D99E8}"/>
+                    </a:ext>
+                  </a:extLst>
+                </p14:cNvPr>
+                <p14:cNvContentPartPr/>
+                <p14:nvPr/>
+              </p14:nvContentPartPr>
+              <p14:xfrm>
+                <a:off x="9912699" y="4461012"/>
+                <a:ext cx="360" cy="360"/>
+              </p14:xfrm>
+            </p:contentPart>
+          </mc:Choice>
+          <mc:Fallback xmlns="">
+            <p:pic>
+              <p:nvPicPr>
+                <p:cNvPr id="34" name="Input penna 33">
+                  <a:extLst>
+                    <a:ext uri="{FF2B5EF4-FFF2-40B4-BE49-F238E27FC236}">
+                      <a16:creationId xmlns:a16="http://schemas.microsoft.com/office/drawing/2014/main" id="{B5D6E831-F232-7048-B904-BE5A012D99E8}"/>
+                    </a:ext>
+                  </a:extLst>
+                </p:cNvPr>
+                <p:cNvPicPr/>
+                <p:nvPr/>
+              </p:nvPicPr>
+              <p:blipFill>
+                <a:blip r:embed="rId8"/>
+                <a:stretch>
+                  <a:fillRect/>
+                </a:stretch>
+              </p:blipFill>
+              <p:spPr>
+                <a:xfrm>
+                  <a:off x="9849699" y="4398372"/>
+                  <a:ext cx="126000" cy="126000"/>
+                </a:xfrm>
+                <a:prstGeom prst="rect">
+                  <a:avLst/>
+                </a:prstGeom>
+              </p:spPr>
+            </p:pic>
+          </mc:Fallback>
+        </mc:AlternateContent>
+        <mc:AlternateContent xmlns:mc="http://schemas.openxmlformats.org/markup-compatibility/2006" xmlns:p14="http://schemas.microsoft.com/office/powerpoint/2010/main">
+          <mc:Choice Requires="p14">
+            <p:contentPart p14:bwMode="auto" r:id="rId32">
+              <p14:nvContentPartPr>
+                <p14:cNvPr id="36" name="Input penna 35">
+                  <a:extLst>
+                    <a:ext uri="{FF2B5EF4-FFF2-40B4-BE49-F238E27FC236}">
+                      <a16:creationId xmlns:a16="http://schemas.microsoft.com/office/drawing/2014/main" id="{2B4EC886-AF19-DC42-B7B0-86CC294591D2}"/>
+                    </a:ext>
+                  </a:extLst>
+                </p14:cNvPr>
+                <p14:cNvContentPartPr/>
+                <p14:nvPr/>
+              </p14:nvContentPartPr>
+              <p14:xfrm>
+                <a:off x="9812979" y="4461012"/>
+                <a:ext cx="360" cy="360"/>
+              </p14:xfrm>
+            </p:contentPart>
+          </mc:Choice>
+          <mc:Fallback xmlns="">
+            <p:pic>
+              <p:nvPicPr>
+                <p:cNvPr id="36" name="Input penna 35">
+                  <a:extLst>
+                    <a:ext uri="{FF2B5EF4-FFF2-40B4-BE49-F238E27FC236}">
+                      <a16:creationId xmlns:a16="http://schemas.microsoft.com/office/drawing/2014/main" id="{2B4EC886-AF19-DC42-B7B0-86CC294591D2}"/>
+                    </a:ext>
+                  </a:extLst>
+                </p:cNvPr>
+                <p:cNvPicPr/>
+                <p:nvPr/>
+              </p:nvPicPr>
+              <p:blipFill>
+                <a:blip r:embed="rId8"/>
+                <a:stretch>
+                  <a:fillRect/>
+                </a:stretch>
+              </p:blipFill>
+              <p:spPr>
+                <a:xfrm>
+                  <a:off x="9750339" y="4398372"/>
+                  <a:ext cx="126000" cy="126000"/>
+                </a:xfrm>
+                <a:prstGeom prst="rect">
+                  <a:avLst/>
+                </a:prstGeom>
+              </p:spPr>
+            </p:pic>
+          </mc:Fallback>
+        </mc:AlternateContent>
+        <mc:AlternateContent xmlns:mc="http://schemas.openxmlformats.org/markup-compatibility/2006" xmlns:p14="http://schemas.microsoft.com/office/powerpoint/2010/main">
+          <mc:Choice Requires="p14">
+            <p:contentPart p14:bwMode="auto" r:id="rId33">
+              <p14:nvContentPartPr>
+                <p14:cNvPr id="37" name="Input penna 36">
+                  <a:extLst>
+                    <a:ext uri="{FF2B5EF4-FFF2-40B4-BE49-F238E27FC236}">
+                      <a16:creationId xmlns:a16="http://schemas.microsoft.com/office/drawing/2014/main" id="{FAFF5BA6-ED97-4540-8256-5F2472CAF863}"/>
+                    </a:ext>
+                  </a:extLst>
+                </p14:cNvPr>
+                <p14:cNvContentPartPr/>
+                <p14:nvPr/>
+              </p14:nvContentPartPr>
+              <p14:xfrm>
+                <a:off x="9821259" y="4464612"/>
+                <a:ext cx="360" cy="360"/>
+              </p14:xfrm>
+            </p:contentPart>
+          </mc:Choice>
+          <mc:Fallback xmlns="">
+            <p:pic>
+              <p:nvPicPr>
+                <p:cNvPr id="37" name="Input penna 36">
+                  <a:extLst>
+                    <a:ext uri="{FF2B5EF4-FFF2-40B4-BE49-F238E27FC236}">
+                      <a16:creationId xmlns:a16="http://schemas.microsoft.com/office/drawing/2014/main" id="{FAFF5BA6-ED97-4540-8256-5F2472CAF863}"/>
+                    </a:ext>
+                  </a:extLst>
+                </p:cNvPr>
+                <p:cNvPicPr/>
+                <p:nvPr/>
+              </p:nvPicPr>
+              <p:blipFill>
+                <a:blip r:embed="rId8"/>
+                <a:stretch>
+                  <a:fillRect/>
+                </a:stretch>
+              </p:blipFill>
+              <p:spPr>
+                <a:xfrm>
+                  <a:off x="9758259" y="4401612"/>
+                  <a:ext cx="126000" cy="126000"/>
+                </a:xfrm>
+                <a:prstGeom prst="rect">
+                  <a:avLst/>
+                </a:prstGeom>
+              </p:spPr>
+            </p:pic>
+          </mc:Fallback>
+        </mc:AlternateContent>
+      </p:grpSp>
+      <p:grpSp>
+        <p:nvGrpSpPr>
+          <p:cNvPr id="42" name="Gruppo 41">
+            <a:extLst>
+              <a:ext uri="{FF2B5EF4-FFF2-40B4-BE49-F238E27FC236}">
+                <a16:creationId xmlns:a16="http://schemas.microsoft.com/office/drawing/2014/main" id="{6CD63CC6-404D-D44A-B4BF-028CC5AA5788}"/>
+              </a:ext>
+            </a:extLst>
+          </p:cNvPr>
+          <p:cNvGrpSpPr/>
+          <p:nvPr/>
+        </p:nvGrpSpPr>
+        <p:grpSpPr>
+          <a:xfrm>
+            <a:off x="11542779" y="2214252"/>
+            <a:ext cx="1440" cy="1440"/>
+            <a:chOff x="11542779" y="2214252"/>
+            <a:chExt cx="1440" cy="1440"/>
+          </a:xfrm>
+        </p:grpSpPr>
+        <mc:AlternateContent xmlns:mc="http://schemas.openxmlformats.org/markup-compatibility/2006" xmlns:p14="http://schemas.microsoft.com/office/powerpoint/2010/main">
+          <mc:Choice Requires="p14">
+            <p:contentPart p14:bwMode="auto" r:id="rId34">
+              <p14:nvContentPartPr>
+                <p14:cNvPr id="40" name="Input penna 39">
+                  <a:extLst>
+                    <a:ext uri="{FF2B5EF4-FFF2-40B4-BE49-F238E27FC236}">
+                      <a16:creationId xmlns:a16="http://schemas.microsoft.com/office/drawing/2014/main" id="{695E538F-6F24-7846-BF10-79EBCB260E41}"/>
+                    </a:ext>
+                  </a:extLst>
+                </p14:cNvPr>
+                <p14:cNvContentPartPr/>
+                <p14:nvPr/>
+              </p14:nvContentPartPr>
+              <p14:xfrm>
+                <a:off x="11542779" y="2215332"/>
+                <a:ext cx="360" cy="360"/>
+              </p14:xfrm>
+            </p:contentPart>
+          </mc:Choice>
+          <mc:Fallback xmlns="">
+            <p:pic>
+              <p:nvPicPr>
+                <p:cNvPr id="40" name="Input penna 39">
+                  <a:extLst>
+                    <a:ext uri="{FF2B5EF4-FFF2-40B4-BE49-F238E27FC236}">
+                      <a16:creationId xmlns:a16="http://schemas.microsoft.com/office/drawing/2014/main" id="{695E538F-6F24-7846-BF10-79EBCB260E41}"/>
+                    </a:ext>
+                  </a:extLst>
+                </p:cNvPr>
+                <p:cNvPicPr/>
+                <p:nvPr/>
+              </p:nvPicPr>
+              <p:blipFill>
+                <a:blip r:embed="rId8"/>
+                <a:stretch>
+                  <a:fillRect/>
+                </a:stretch>
+              </p:blipFill>
+              <p:spPr>
+                <a:xfrm>
+                  <a:off x="11479779" y="2152332"/>
+                  <a:ext cx="126000" cy="126000"/>
+                </a:xfrm>
+                <a:prstGeom prst="rect">
+                  <a:avLst/>
+                </a:prstGeom>
+              </p:spPr>
+            </p:pic>
+          </mc:Fallback>
+        </mc:AlternateContent>
+        <mc:AlternateContent xmlns:mc="http://schemas.openxmlformats.org/markup-compatibility/2006" xmlns:p14="http://schemas.microsoft.com/office/powerpoint/2010/main">
+          <mc:Choice Requires="p14">
+            <p:contentPart p14:bwMode="auto" r:id="rId35">
+              <p14:nvContentPartPr>
+                <p14:cNvPr id="41" name="Input penna 40">
+                  <a:extLst>
+                    <a:ext uri="{FF2B5EF4-FFF2-40B4-BE49-F238E27FC236}">
+                      <a16:creationId xmlns:a16="http://schemas.microsoft.com/office/drawing/2014/main" id="{C98E75E2-1045-A640-9DF0-59599A1FA040}"/>
+                    </a:ext>
+                  </a:extLst>
+                </p14:cNvPr>
+                <p14:cNvContentPartPr/>
+                <p14:nvPr/>
+              </p14:nvContentPartPr>
+              <p14:xfrm>
+                <a:off x="11543859" y="2214252"/>
+                <a:ext cx="360" cy="360"/>
+              </p14:xfrm>
+            </p:contentPart>
+          </mc:Choice>
+          <mc:Fallback xmlns="">
+            <p:pic>
+              <p:nvPicPr>
+                <p:cNvPr id="41" name="Input penna 40">
+                  <a:extLst>
+                    <a:ext uri="{FF2B5EF4-FFF2-40B4-BE49-F238E27FC236}">
+                      <a16:creationId xmlns:a16="http://schemas.microsoft.com/office/drawing/2014/main" id="{C98E75E2-1045-A640-9DF0-59599A1FA040}"/>
+                    </a:ext>
+                  </a:extLst>
+                </p:cNvPr>
+                <p:cNvPicPr/>
+                <p:nvPr/>
+              </p:nvPicPr>
+              <p:blipFill>
+                <a:blip r:embed="rId8"/>
+                <a:stretch>
+                  <a:fillRect/>
+                </a:stretch>
+              </p:blipFill>
+              <p:spPr>
+                <a:xfrm>
+                  <a:off x="11480859" y="2151252"/>
+                  <a:ext cx="126000" cy="126000"/>
+                </a:xfrm>
+                <a:prstGeom prst="rect">
+                  <a:avLst/>
+                </a:prstGeom>
+              </p:spPr>
+            </p:pic>
+          </mc:Fallback>
+        </mc:AlternateContent>
+      </p:grpSp>
+      <p:grpSp>
+        <p:nvGrpSpPr>
+          <p:cNvPr id="45" name="Gruppo 44">
+            <a:extLst>
+              <a:ext uri="{FF2B5EF4-FFF2-40B4-BE49-F238E27FC236}">
+                <a16:creationId xmlns:a16="http://schemas.microsoft.com/office/drawing/2014/main" id="{B58754B5-6607-2547-BFB0-F30C6E4D4DB0}"/>
+              </a:ext>
+            </a:extLst>
+          </p:cNvPr>
+          <p:cNvGrpSpPr/>
+          <p:nvPr/>
+        </p:nvGrpSpPr>
+        <p:grpSpPr>
+          <a:xfrm>
+            <a:off x="12969819" y="2202372"/>
+            <a:ext cx="360" cy="360"/>
+            <a:chOff x="12969819" y="2202372"/>
+            <a:chExt cx="360" cy="360"/>
+          </a:xfrm>
+        </p:grpSpPr>
+        <mc:AlternateContent xmlns:mc="http://schemas.openxmlformats.org/markup-compatibility/2006" xmlns:p14="http://schemas.microsoft.com/office/powerpoint/2010/main">
+          <mc:Choice Requires="p14">
+            <p:contentPart p14:bwMode="auto" r:id="rId36">
+              <p14:nvContentPartPr>
+                <p14:cNvPr id="43" name="Input penna 42">
+                  <a:extLst>
+                    <a:ext uri="{FF2B5EF4-FFF2-40B4-BE49-F238E27FC236}">
+                      <a16:creationId xmlns:a16="http://schemas.microsoft.com/office/drawing/2014/main" id="{50E465C8-B14E-A441-8914-936E638A58C5}"/>
+                    </a:ext>
+                  </a:extLst>
+                </p14:cNvPr>
+                <p14:cNvContentPartPr/>
+                <p14:nvPr/>
+              </p14:nvContentPartPr>
+              <p14:xfrm>
+                <a:off x="12969819" y="2202372"/>
+                <a:ext cx="360" cy="360"/>
+              </p14:xfrm>
+            </p:contentPart>
+          </mc:Choice>
+          <mc:Fallback xmlns="">
+            <p:pic>
+              <p:nvPicPr>
+                <p:cNvPr id="43" name="Input penna 42">
+                  <a:extLst>
+                    <a:ext uri="{FF2B5EF4-FFF2-40B4-BE49-F238E27FC236}">
+                      <a16:creationId xmlns:a16="http://schemas.microsoft.com/office/drawing/2014/main" id="{50E465C8-B14E-A441-8914-936E638A58C5}"/>
+                    </a:ext>
+                  </a:extLst>
+                </p:cNvPr>
+                <p:cNvPicPr/>
+                <p:nvPr/>
+              </p:nvPicPr>
+              <p:blipFill>
+                <a:blip r:embed="rId8"/>
+                <a:stretch>
+                  <a:fillRect/>
+                </a:stretch>
+              </p:blipFill>
+              <p:spPr>
+                <a:xfrm>
+                  <a:off x="12907179" y="2139732"/>
+                  <a:ext cx="126000" cy="126000"/>
+                </a:xfrm>
+                <a:prstGeom prst="rect">
+                  <a:avLst/>
+                </a:prstGeom>
+              </p:spPr>
+            </p:pic>
+          </mc:Fallback>
+        </mc:AlternateContent>
+        <mc:AlternateContent xmlns:mc="http://schemas.openxmlformats.org/markup-compatibility/2006" xmlns:p14="http://schemas.microsoft.com/office/powerpoint/2010/main">
+          <mc:Choice Requires="p14">
+            <p:contentPart p14:bwMode="auto" r:id="rId37">
+              <p14:nvContentPartPr>
+                <p14:cNvPr id="44" name="Input penna 43">
+                  <a:extLst>
+                    <a:ext uri="{FF2B5EF4-FFF2-40B4-BE49-F238E27FC236}">
+                      <a16:creationId xmlns:a16="http://schemas.microsoft.com/office/drawing/2014/main" id="{C35DD7A1-BDF9-0246-BCD8-6F3899AF28AC}"/>
+                    </a:ext>
+                  </a:extLst>
+                </p14:cNvPr>
+                <p14:cNvContentPartPr/>
+                <p14:nvPr/>
+              </p14:nvContentPartPr>
+              <p14:xfrm>
+                <a:off x="12969819" y="2202372"/>
+                <a:ext cx="360" cy="360"/>
+              </p14:xfrm>
+            </p:contentPart>
+          </mc:Choice>
+          <mc:Fallback xmlns="">
+            <p:pic>
+              <p:nvPicPr>
+                <p:cNvPr id="44" name="Input penna 43">
+                  <a:extLst>
+                    <a:ext uri="{FF2B5EF4-FFF2-40B4-BE49-F238E27FC236}">
+                      <a16:creationId xmlns:a16="http://schemas.microsoft.com/office/drawing/2014/main" id="{C35DD7A1-BDF9-0246-BCD8-6F3899AF28AC}"/>
+                    </a:ext>
+                  </a:extLst>
+                </p:cNvPr>
+                <p:cNvPicPr/>
+                <p:nvPr/>
+              </p:nvPicPr>
+              <p:blipFill>
+                <a:blip r:embed="rId8"/>
+                <a:stretch>
+                  <a:fillRect/>
+                </a:stretch>
+              </p:blipFill>
+              <p:spPr>
+                <a:xfrm>
+                  <a:off x="12907179" y="2139732"/>
+                  <a:ext cx="126000" cy="126000"/>
+                </a:xfrm>
+                <a:prstGeom prst="rect">
+                  <a:avLst/>
+                </a:prstGeom>
+              </p:spPr>
+            </p:pic>
+          </mc:Fallback>
+        </mc:AlternateContent>
+      </p:grpSp>
+      <p:grpSp>
+        <p:nvGrpSpPr>
+          <p:cNvPr id="48" name="Gruppo 47">
+            <a:extLst>
+              <a:ext uri="{FF2B5EF4-FFF2-40B4-BE49-F238E27FC236}">
+                <a16:creationId xmlns:a16="http://schemas.microsoft.com/office/drawing/2014/main" id="{6CC17412-8ECE-1D4B-B82D-C4CB36318644}"/>
+              </a:ext>
+            </a:extLst>
+          </p:cNvPr>
+          <p:cNvGrpSpPr/>
+          <p:nvPr/>
+        </p:nvGrpSpPr>
+        <p:grpSpPr>
+          <a:xfrm>
+            <a:off x="13850019" y="2214972"/>
+            <a:ext cx="1440" cy="360"/>
+            <a:chOff x="13850019" y="2214972"/>
+            <a:chExt cx="1440" cy="360"/>
+          </a:xfrm>
+        </p:grpSpPr>
+        <mc:AlternateContent xmlns:mc="http://schemas.openxmlformats.org/markup-compatibility/2006" xmlns:p14="http://schemas.microsoft.com/office/powerpoint/2010/main">
+          <mc:Choice Requires="p14">
+            <p:contentPart p14:bwMode="auto" r:id="rId38">
+              <p14:nvContentPartPr>
+                <p14:cNvPr id="46" name="Input penna 45">
+                  <a:extLst>
+                    <a:ext uri="{FF2B5EF4-FFF2-40B4-BE49-F238E27FC236}">
+                      <a16:creationId xmlns:a16="http://schemas.microsoft.com/office/drawing/2014/main" id="{B9C42C4F-9023-354E-8D38-03A63C52BC13}"/>
+                    </a:ext>
+                  </a:extLst>
+                </p14:cNvPr>
+                <p14:cNvContentPartPr/>
+                <p14:nvPr/>
+              </p14:nvContentPartPr>
+              <p14:xfrm>
+                <a:off x="13850019" y="2214972"/>
+                <a:ext cx="360" cy="360"/>
+              </p14:xfrm>
+            </p:contentPart>
+          </mc:Choice>
+          <mc:Fallback xmlns="">
+            <p:pic>
+              <p:nvPicPr>
+                <p:cNvPr id="46" name="Input penna 45">
+                  <a:extLst>
+                    <a:ext uri="{FF2B5EF4-FFF2-40B4-BE49-F238E27FC236}">
+                      <a16:creationId xmlns:a16="http://schemas.microsoft.com/office/drawing/2014/main" id="{B9C42C4F-9023-354E-8D38-03A63C52BC13}"/>
+                    </a:ext>
+                  </a:extLst>
+                </p:cNvPr>
+                <p:cNvPicPr/>
+                <p:nvPr/>
+              </p:nvPicPr>
+              <p:blipFill>
+                <a:blip r:embed="rId8"/>
+                <a:stretch>
+                  <a:fillRect/>
+                </a:stretch>
+              </p:blipFill>
+              <p:spPr>
+                <a:xfrm>
+                  <a:off x="13787019" y="2151972"/>
+                  <a:ext cx="126000" cy="126000"/>
+                </a:xfrm>
+                <a:prstGeom prst="rect">
+                  <a:avLst/>
+                </a:prstGeom>
+              </p:spPr>
+            </p:pic>
+          </mc:Fallback>
+        </mc:AlternateContent>
+        <mc:AlternateContent xmlns:mc="http://schemas.openxmlformats.org/markup-compatibility/2006" xmlns:p14="http://schemas.microsoft.com/office/powerpoint/2010/main">
+          <mc:Choice Requires="p14">
+            <p:contentPart p14:bwMode="auto" r:id="rId39">
+              <p14:nvContentPartPr>
+                <p14:cNvPr id="47" name="Input penna 46">
+                  <a:extLst>
+                    <a:ext uri="{FF2B5EF4-FFF2-40B4-BE49-F238E27FC236}">
+                      <a16:creationId xmlns:a16="http://schemas.microsoft.com/office/drawing/2014/main" id="{45B64C1C-4126-734B-8DF7-94747735CC05}"/>
+                    </a:ext>
+                  </a:extLst>
+                </p14:cNvPr>
+                <p14:cNvContentPartPr/>
+                <p14:nvPr/>
+              </p14:nvContentPartPr>
+              <p14:xfrm>
+                <a:off x="13851099" y="2214972"/>
+                <a:ext cx="360" cy="360"/>
+              </p14:xfrm>
+            </p:contentPart>
+          </mc:Choice>
+          <mc:Fallback xmlns="">
+            <p:pic>
+              <p:nvPicPr>
+                <p:cNvPr id="47" name="Input penna 46">
+                  <a:extLst>
+                    <a:ext uri="{FF2B5EF4-FFF2-40B4-BE49-F238E27FC236}">
+                      <a16:creationId xmlns:a16="http://schemas.microsoft.com/office/drawing/2014/main" id="{45B64C1C-4126-734B-8DF7-94747735CC05}"/>
+                    </a:ext>
+                  </a:extLst>
+                </p:cNvPr>
+                <p:cNvPicPr/>
+                <p:nvPr/>
+              </p:nvPicPr>
+              <p:blipFill>
+                <a:blip r:embed="rId8"/>
+                <a:stretch>
+                  <a:fillRect/>
+                </a:stretch>
+              </p:blipFill>
+              <p:spPr>
+                <a:xfrm>
+                  <a:off x="13788099" y="2151972"/>
+                  <a:ext cx="126000" cy="126000"/>
+                </a:xfrm>
+                <a:prstGeom prst="rect">
+                  <a:avLst/>
+                </a:prstGeom>
+              </p:spPr>
+            </p:pic>
+          </mc:Fallback>
+        </mc:AlternateContent>
+      </p:grpSp>
+      <mc:AlternateContent xmlns:mc="http://schemas.openxmlformats.org/markup-compatibility/2006" xmlns:p14="http://schemas.microsoft.com/office/powerpoint/2010/main">
+        <mc:Choice Requires="p14">
+          <p:contentPart p14:bwMode="auto" r:id="rId40">
+            <p14:nvContentPartPr>
+              <p14:cNvPr id="49" name="Input penna 48">
+                <a:extLst>
+                  <a:ext uri="{FF2B5EF4-FFF2-40B4-BE49-F238E27FC236}">
+                    <a16:creationId xmlns:a16="http://schemas.microsoft.com/office/drawing/2014/main" id="{95B98188-26C6-AD43-990C-6391C63DEDF4}"/>
+                  </a:ext>
+                </a:extLst>
+              </p14:cNvPr>
+              <p14:cNvContentPartPr/>
+              <p14:nvPr/>
+            </p14:nvContentPartPr>
+            <p14:xfrm>
+              <a:off x="9503379" y="2463372"/>
+              <a:ext cx="360" cy="360"/>
+            </p14:xfrm>
+          </p:contentPart>
+        </mc:Choice>
+        <mc:Fallback xmlns="">
+          <p:pic>
+            <p:nvPicPr>
+              <p:cNvPr id="49" name="Input penna 48">
+                <a:extLst>
+                  <a:ext uri="{FF2B5EF4-FFF2-40B4-BE49-F238E27FC236}">
+                    <a16:creationId xmlns:a16="http://schemas.microsoft.com/office/drawing/2014/main" id="{95B98188-26C6-AD43-990C-6391C63DEDF4}"/>
+                  </a:ext>
+                </a:extLst>
+              </p:cNvPr>
+              <p:cNvPicPr/>
+              <p:nvPr/>
+            </p:nvPicPr>
+            <p:blipFill>
+              <a:blip r:embed="rId8"/>
+              <a:stretch>
+                <a:fillRect/>
+              </a:stretch>
+            </p:blipFill>
+            <p:spPr>
+              <a:xfrm>
+                <a:off x="9440739" y="2400732"/>
+                <a:ext cx="126000" cy="126000"/>
+              </a:xfrm>
+              <a:prstGeom prst="rect">
+                <a:avLst/>
+              </a:prstGeom>
+            </p:spPr>
+          </p:pic>
+        </mc:Fallback>
+      </mc:AlternateContent>
+      <mc:AlternateContent xmlns:mc="http://schemas.openxmlformats.org/markup-compatibility/2006" xmlns:p14="http://schemas.microsoft.com/office/powerpoint/2010/main">
+        <mc:Choice Requires="p14">
+          <p:contentPart p14:bwMode="auto" r:id="rId41">
+            <p14:nvContentPartPr>
+              <p14:cNvPr id="50" name="Input penna 49">
+                <a:extLst>
+                  <a:ext uri="{FF2B5EF4-FFF2-40B4-BE49-F238E27FC236}">
+                    <a16:creationId xmlns:a16="http://schemas.microsoft.com/office/drawing/2014/main" id="{6D2CC15D-CBA3-494C-B03B-300331A9647A}"/>
+                  </a:ext>
+                </a:extLst>
+              </p14:cNvPr>
+              <p14:cNvContentPartPr/>
+              <p14:nvPr/>
+            </p14:nvContentPartPr>
+            <p14:xfrm>
+              <a:off x="9155619" y="3402252"/>
+              <a:ext cx="360" cy="360"/>
+            </p14:xfrm>
+          </p:contentPart>
+        </mc:Choice>
+        <mc:Fallback xmlns="">
+          <p:pic>
+            <p:nvPicPr>
+              <p:cNvPr id="50" name="Input penna 49">
+                <a:extLst>
+                  <a:ext uri="{FF2B5EF4-FFF2-40B4-BE49-F238E27FC236}">
+                    <a16:creationId xmlns:a16="http://schemas.microsoft.com/office/drawing/2014/main" id="{6D2CC15D-CBA3-494C-B03B-300331A9647A}"/>
+                  </a:ext>
+                </a:extLst>
+              </p:cNvPr>
+              <p:cNvPicPr/>
+              <p:nvPr/>
+            </p:nvPicPr>
+            <p:blipFill>
+              <a:blip r:embed="rId8"/>
+              <a:stretch>
+                <a:fillRect/>
+              </a:stretch>
+            </p:blipFill>
+            <p:spPr>
+              <a:xfrm>
+                <a:off x="9092979" y="3339252"/>
+                <a:ext cx="126000" cy="126000"/>
+              </a:xfrm>
+              <a:prstGeom prst="rect">
+                <a:avLst/>
+              </a:prstGeom>
+            </p:spPr>
+          </p:pic>
+        </mc:Fallback>
+      </mc:AlternateContent>
     </p:spTree>
     <p:extLst>
       <p:ext uri="{BB962C8B-B14F-4D97-AF65-F5344CB8AC3E}">
-        <p14:creationId xmlns:p14="http://schemas.microsoft.com/office/powerpoint/2010/main" val="4284197351"/>
+        <p14:creationId xmlns:p14="http://schemas.microsoft.com/office/powerpoint/2010/main" val="3221518062"/>
       </p:ext>
     </p:extLst>
   </p:cSld>

</xml_diff>